<commit_message>
ajout des fichiers xml
</commit_message>
<xml_diff>
--- a/plus/Formulaire_Connectlife.pptx
+++ b/plus/Formulaire_Connectlife.pptx
@@ -13,24 +13,24 @@
   <p:sldIdLst>
     <p:sldId id="257" r:id="rId2"/>
     <p:sldId id="263" r:id="rId3"/>
-    <p:sldId id="274" r:id="rId4"/>
-    <p:sldId id="262" r:id="rId5"/>
-    <p:sldId id="264" r:id="rId6"/>
-    <p:sldId id="267" r:id="rId7"/>
-    <p:sldId id="273" r:id="rId8"/>
-    <p:sldId id="265" r:id="rId9"/>
-    <p:sldId id="266" r:id="rId10"/>
-    <p:sldId id="268" r:id="rId11"/>
-    <p:sldId id="275" r:id="rId12"/>
-    <p:sldId id="276" r:id="rId13"/>
-    <p:sldId id="277" r:id="rId14"/>
-    <p:sldId id="278" r:id="rId15"/>
-    <p:sldId id="279" r:id="rId16"/>
-    <p:sldId id="280" r:id="rId17"/>
-    <p:sldId id="269" r:id="rId18"/>
-    <p:sldId id="281" r:id="rId19"/>
-    <p:sldId id="270" r:id="rId20"/>
-    <p:sldId id="282" r:id="rId21"/>
+    <p:sldId id="262" r:id="rId4"/>
+    <p:sldId id="264" r:id="rId5"/>
+    <p:sldId id="267" r:id="rId6"/>
+    <p:sldId id="273" r:id="rId7"/>
+    <p:sldId id="265" r:id="rId8"/>
+    <p:sldId id="266" r:id="rId9"/>
+    <p:sldId id="268" r:id="rId10"/>
+    <p:sldId id="275" r:id="rId11"/>
+    <p:sldId id="276" r:id="rId12"/>
+    <p:sldId id="277" r:id="rId13"/>
+    <p:sldId id="278" r:id="rId14"/>
+    <p:sldId id="279" r:id="rId15"/>
+    <p:sldId id="280" r:id="rId16"/>
+    <p:sldId id="269" r:id="rId17"/>
+    <p:sldId id="281" r:id="rId18"/>
+    <p:sldId id="270" r:id="rId19"/>
+    <p:sldId id="282" r:id="rId20"/>
+    <p:sldId id="284" r:id="rId21"/>
     <p:sldId id="271" r:id="rId22"/>
     <p:sldId id="272" r:id="rId23"/>
   </p:sldIdLst>
@@ -893,7 +893,7 @@
 <dgm:dataModel xmlns:dgm="http://schemas.openxmlformats.org/drawingml/2006/diagram" xmlns:a="http://schemas.openxmlformats.org/drawingml/2006/main">
   <dgm:ptLst>
     <dgm:pt modelId="{8933EB82-CD30-42F0-B705-08B4E7C4462A}" type="doc">
-      <dgm:prSet loTypeId="urn:microsoft.com/office/officeart/2016/7/layout/RepeatingBendingProcessNew" loCatId="process" qsTypeId="urn:microsoft.com/office/officeart/2005/8/quickstyle/simple2" qsCatId="simple" csTypeId="urn:microsoft.com/office/officeart/2005/8/colors/accent1_2" csCatId="accent1"/>
+      <dgm:prSet loTypeId="urn:microsoft.com/office/officeart/2016/7/layout/RepeatingBendingProcessNew" loCatId="process" qsTypeId="urn:microsoft.com/office/officeart/2005/8/quickstyle/simple2" qsCatId="simple" csTypeId="urn:microsoft.com/office/officeart/2005/8/colors/accent1_2" csCatId="accent1" phldr="1"/>
       <dgm:spPr/>
       <dgm:t>
         <a:bodyPr/>
@@ -948,10 +948,10 @@
         <a:lstStyle/>
         <a:p>
           <a:r>
-            <a:rPr lang="fr-FR"/>
-            <a:t>Technologie utilisé</a:t>
+            <a:rPr lang="fr-FR" dirty="0"/>
+            <a:t>Technologies utilisées</a:t>
           </a:r>
-          <a:endParaRPr lang="en-US"/>
+          <a:endParaRPr lang="en-US" dirty="0"/>
         </a:p>
       </dgm:t>
     </dgm:pt>
@@ -1170,10 +1170,10 @@
         <a:lstStyle/>
         <a:p>
           <a:r>
-            <a:rPr lang="fr-FR"/>
-            <a:t>Test du formulaire du particulier</a:t>
+            <a:rPr lang="fr-FR" dirty="0"/>
+            <a:t>Formulaire du particulier</a:t>
           </a:r>
-          <a:endParaRPr lang="en-US"/>
+          <a:endParaRPr lang="en-US" dirty="0"/>
         </a:p>
       </dgm:t>
     </dgm:pt>
@@ -1208,7 +1208,7 @@
         <a:p>
           <a:r>
             <a:rPr lang="fr-FR" dirty="0"/>
-            <a:t>Test du formulaire du professionnel</a:t>
+            <a:t>Formulaire du professionnel</a:t>
           </a:r>
           <a:endParaRPr lang="en-US" dirty="0"/>
         </a:p>
@@ -1245,7 +1245,7 @@
         <a:p>
           <a:r>
             <a:rPr lang="fr-FR" dirty="0"/>
-            <a:t>Conclusion</a:t>
+            <a:t>Récupération des clients</a:t>
           </a:r>
           <a:endParaRPr lang="en-US" dirty="0"/>
         </a:p>
@@ -1273,6 +1273,43 @@
         </a:p>
       </dgm:t>
     </dgm:pt>
+    <dgm:pt modelId="{B6F2C99C-A5E7-4734-A85D-609DDFFD3A9F}">
+      <dgm:prSet/>
+      <dgm:spPr/>
+      <dgm:t>
+        <a:bodyPr/>
+        <a:lstStyle/>
+        <a:p>
+          <a:r>
+            <a:rPr lang="fr-FR" dirty="0"/>
+            <a:t>Conclusion</a:t>
+          </a:r>
+          <a:endParaRPr lang="en-US" dirty="0"/>
+        </a:p>
+      </dgm:t>
+    </dgm:pt>
+    <dgm:pt modelId="{CEB7388F-ADA1-4981-8E95-9B9C862EEAF0}" type="parTrans" cxnId="{B1E0A8E2-AC98-4FBA-9352-2AB25A28E2A4}">
+      <dgm:prSet/>
+      <dgm:spPr/>
+      <dgm:t>
+        <a:bodyPr/>
+        <a:lstStyle/>
+        <a:p>
+          <a:endParaRPr lang="fr-FR"/>
+        </a:p>
+      </dgm:t>
+    </dgm:pt>
+    <dgm:pt modelId="{1BD5088B-B6B4-4795-A82D-B3E0760FC060}" type="sibTrans" cxnId="{B1E0A8E2-AC98-4FBA-9352-2AB25A28E2A4}">
+      <dgm:prSet/>
+      <dgm:spPr/>
+      <dgm:t>
+        <a:bodyPr/>
+        <a:lstStyle/>
+        <a:p>
+          <a:endParaRPr lang="fr-FR"/>
+        </a:p>
+      </dgm:t>
+    </dgm:pt>
     <dgm:pt modelId="{C13C8027-67BA-46FE-AD70-CA5C99057C64}" type="pres">
       <dgm:prSet presAssocID="{8933EB82-CD30-42F0-B705-08B4E7C4462A}" presName="Name0" presStyleCnt="0">
         <dgm:presLayoutVars>
@@ -1283,7 +1320,7 @@
       <dgm:spPr/>
     </dgm:pt>
     <dgm:pt modelId="{8D1A8309-38F2-47B5-8067-A4EFCAF03F12}" type="pres">
-      <dgm:prSet presAssocID="{4275A204-03DC-4D22-A715-8B95191AFC9C}" presName="node" presStyleLbl="node1" presStyleIdx="0" presStyleCnt="10">
+      <dgm:prSet presAssocID="{4275A204-03DC-4D22-A715-8B95191AFC9C}" presName="node" presStyleLbl="node1" presStyleIdx="0" presStyleCnt="11">
         <dgm:presLayoutVars>
           <dgm:bulletEnabled val="1"/>
         </dgm:presLayoutVars>
@@ -1291,15 +1328,15 @@
       <dgm:spPr/>
     </dgm:pt>
     <dgm:pt modelId="{D279B056-5069-4CF7-B394-934A89EA551E}" type="pres">
-      <dgm:prSet presAssocID="{70AE54DD-BA3F-4073-98C1-72C99EE74D3C}" presName="sibTrans" presStyleLbl="sibTrans1D1" presStyleIdx="0" presStyleCnt="9"/>
+      <dgm:prSet presAssocID="{70AE54DD-BA3F-4073-98C1-72C99EE74D3C}" presName="sibTrans" presStyleLbl="sibTrans1D1" presStyleIdx="0" presStyleCnt="10"/>
       <dgm:spPr/>
     </dgm:pt>
     <dgm:pt modelId="{66B18661-2952-42C6-8926-E8D9DD313FD0}" type="pres">
-      <dgm:prSet presAssocID="{70AE54DD-BA3F-4073-98C1-72C99EE74D3C}" presName="connectorText" presStyleLbl="sibTrans1D1" presStyleIdx="0" presStyleCnt="9"/>
+      <dgm:prSet presAssocID="{70AE54DD-BA3F-4073-98C1-72C99EE74D3C}" presName="connectorText" presStyleLbl="sibTrans1D1" presStyleIdx="0" presStyleCnt="10"/>
       <dgm:spPr/>
     </dgm:pt>
     <dgm:pt modelId="{A1163E2A-1B9E-486F-A74C-00611706C490}" type="pres">
-      <dgm:prSet presAssocID="{ABFC6990-E256-4718-A3FA-EAE5F7B70724}" presName="node" presStyleLbl="node1" presStyleIdx="1" presStyleCnt="10">
+      <dgm:prSet presAssocID="{ABFC6990-E256-4718-A3FA-EAE5F7B70724}" presName="node" presStyleLbl="node1" presStyleIdx="1" presStyleCnt="11">
         <dgm:presLayoutVars>
           <dgm:bulletEnabled val="1"/>
         </dgm:presLayoutVars>
@@ -1307,15 +1344,15 @@
       <dgm:spPr/>
     </dgm:pt>
     <dgm:pt modelId="{4D3B1D16-BFDA-4F29-8094-458700F2E109}" type="pres">
-      <dgm:prSet presAssocID="{238E7B91-22BF-454B-9805-4FE8FC04B3D9}" presName="sibTrans" presStyleLbl="sibTrans1D1" presStyleIdx="1" presStyleCnt="9"/>
+      <dgm:prSet presAssocID="{238E7B91-22BF-454B-9805-4FE8FC04B3D9}" presName="sibTrans" presStyleLbl="sibTrans1D1" presStyleIdx="1" presStyleCnt="10"/>
       <dgm:spPr/>
     </dgm:pt>
     <dgm:pt modelId="{131E8324-0824-4C70-BA3F-5C1F902DF9AB}" type="pres">
-      <dgm:prSet presAssocID="{238E7B91-22BF-454B-9805-4FE8FC04B3D9}" presName="connectorText" presStyleLbl="sibTrans1D1" presStyleIdx="1" presStyleCnt="9"/>
+      <dgm:prSet presAssocID="{238E7B91-22BF-454B-9805-4FE8FC04B3D9}" presName="connectorText" presStyleLbl="sibTrans1D1" presStyleIdx="1" presStyleCnt="10"/>
       <dgm:spPr/>
     </dgm:pt>
     <dgm:pt modelId="{0B2A8F0F-46D4-4AF0-8239-9CA16BD5E92D}" type="pres">
-      <dgm:prSet presAssocID="{8682AA7B-FE0D-453B-B768-DF3C7FC07090}" presName="node" presStyleLbl="node1" presStyleIdx="2" presStyleCnt="10">
+      <dgm:prSet presAssocID="{8682AA7B-FE0D-453B-B768-DF3C7FC07090}" presName="node" presStyleLbl="node1" presStyleIdx="2" presStyleCnt="11">
         <dgm:presLayoutVars>
           <dgm:bulletEnabled val="1"/>
         </dgm:presLayoutVars>
@@ -1323,15 +1360,15 @@
       <dgm:spPr/>
     </dgm:pt>
     <dgm:pt modelId="{636473E1-C855-4C90-AE7D-F9C986181807}" type="pres">
-      <dgm:prSet presAssocID="{0DCAE78B-F242-4865-841F-A6538A1A5441}" presName="sibTrans" presStyleLbl="sibTrans1D1" presStyleIdx="2" presStyleCnt="9"/>
+      <dgm:prSet presAssocID="{0DCAE78B-F242-4865-841F-A6538A1A5441}" presName="sibTrans" presStyleLbl="sibTrans1D1" presStyleIdx="2" presStyleCnt="10"/>
       <dgm:spPr/>
     </dgm:pt>
     <dgm:pt modelId="{E7BFD4B9-5E0D-4988-9FD0-0828273E7B9E}" type="pres">
-      <dgm:prSet presAssocID="{0DCAE78B-F242-4865-841F-A6538A1A5441}" presName="connectorText" presStyleLbl="sibTrans1D1" presStyleIdx="2" presStyleCnt="9"/>
+      <dgm:prSet presAssocID="{0DCAE78B-F242-4865-841F-A6538A1A5441}" presName="connectorText" presStyleLbl="sibTrans1D1" presStyleIdx="2" presStyleCnt="10"/>
       <dgm:spPr/>
     </dgm:pt>
     <dgm:pt modelId="{B3BE7A2B-3615-45A5-9576-4640183FC6F3}" type="pres">
-      <dgm:prSet presAssocID="{82FB9E83-8A52-48DC-B6C2-1A8F70B2E830}" presName="node" presStyleLbl="node1" presStyleIdx="3" presStyleCnt="10">
+      <dgm:prSet presAssocID="{82FB9E83-8A52-48DC-B6C2-1A8F70B2E830}" presName="node" presStyleLbl="node1" presStyleIdx="3" presStyleCnt="11">
         <dgm:presLayoutVars>
           <dgm:bulletEnabled val="1"/>
         </dgm:presLayoutVars>
@@ -1339,15 +1376,15 @@
       <dgm:spPr/>
     </dgm:pt>
     <dgm:pt modelId="{EA50DB3A-C4ED-4989-B1D9-D04B5E72027C}" type="pres">
-      <dgm:prSet presAssocID="{18E28312-0EF9-4309-84EF-F5414D648520}" presName="sibTrans" presStyleLbl="sibTrans1D1" presStyleIdx="3" presStyleCnt="9"/>
+      <dgm:prSet presAssocID="{18E28312-0EF9-4309-84EF-F5414D648520}" presName="sibTrans" presStyleLbl="sibTrans1D1" presStyleIdx="3" presStyleCnt="10"/>
       <dgm:spPr/>
     </dgm:pt>
     <dgm:pt modelId="{2C1EC30A-82B3-4E9B-A8D7-1070EB8DF4F0}" type="pres">
-      <dgm:prSet presAssocID="{18E28312-0EF9-4309-84EF-F5414D648520}" presName="connectorText" presStyleLbl="sibTrans1D1" presStyleIdx="3" presStyleCnt="9"/>
+      <dgm:prSet presAssocID="{18E28312-0EF9-4309-84EF-F5414D648520}" presName="connectorText" presStyleLbl="sibTrans1D1" presStyleIdx="3" presStyleCnt="10"/>
       <dgm:spPr/>
     </dgm:pt>
     <dgm:pt modelId="{DD9AEEE5-3EFA-4308-ACE7-3E0901EC9832}" type="pres">
-      <dgm:prSet presAssocID="{B004AFBB-BE5E-4EC1-9499-A4BB2317EDD7}" presName="node" presStyleLbl="node1" presStyleIdx="4" presStyleCnt="10">
+      <dgm:prSet presAssocID="{B004AFBB-BE5E-4EC1-9499-A4BB2317EDD7}" presName="node" presStyleLbl="node1" presStyleIdx="4" presStyleCnt="11">
         <dgm:presLayoutVars>
           <dgm:bulletEnabled val="1"/>
         </dgm:presLayoutVars>
@@ -1355,15 +1392,15 @@
       <dgm:spPr/>
     </dgm:pt>
     <dgm:pt modelId="{6B0D86FF-FD4E-469D-818C-2A08EDE7D092}" type="pres">
-      <dgm:prSet presAssocID="{44963C0E-8F7A-47AE-B286-D4F32BA530AC}" presName="sibTrans" presStyleLbl="sibTrans1D1" presStyleIdx="4" presStyleCnt="9"/>
+      <dgm:prSet presAssocID="{44963C0E-8F7A-47AE-B286-D4F32BA530AC}" presName="sibTrans" presStyleLbl="sibTrans1D1" presStyleIdx="4" presStyleCnt="10"/>
       <dgm:spPr/>
     </dgm:pt>
     <dgm:pt modelId="{7418B14B-A8CA-48FD-BAAA-7A05B752976F}" type="pres">
-      <dgm:prSet presAssocID="{44963C0E-8F7A-47AE-B286-D4F32BA530AC}" presName="connectorText" presStyleLbl="sibTrans1D1" presStyleIdx="4" presStyleCnt="9"/>
+      <dgm:prSet presAssocID="{44963C0E-8F7A-47AE-B286-D4F32BA530AC}" presName="connectorText" presStyleLbl="sibTrans1D1" presStyleIdx="4" presStyleCnt="10"/>
       <dgm:spPr/>
     </dgm:pt>
     <dgm:pt modelId="{5E3CE6A5-F33F-4BFD-8D63-192764F860D4}" type="pres">
-      <dgm:prSet presAssocID="{32490ECE-B11C-4BDF-B6EA-40F8EE1CB894}" presName="node" presStyleLbl="node1" presStyleIdx="5" presStyleCnt="10">
+      <dgm:prSet presAssocID="{32490ECE-B11C-4BDF-B6EA-40F8EE1CB894}" presName="node" presStyleLbl="node1" presStyleIdx="5" presStyleCnt="11">
         <dgm:presLayoutVars>
           <dgm:bulletEnabled val="1"/>
         </dgm:presLayoutVars>
@@ -1371,15 +1408,15 @@
       <dgm:spPr/>
     </dgm:pt>
     <dgm:pt modelId="{769E685F-8BCD-447B-AE64-0BBE91553F7D}" type="pres">
-      <dgm:prSet presAssocID="{1561AE6E-718F-4486-9C90-E7047C8B0C2D}" presName="sibTrans" presStyleLbl="sibTrans1D1" presStyleIdx="5" presStyleCnt="9"/>
+      <dgm:prSet presAssocID="{1561AE6E-718F-4486-9C90-E7047C8B0C2D}" presName="sibTrans" presStyleLbl="sibTrans1D1" presStyleIdx="5" presStyleCnt="10"/>
       <dgm:spPr/>
     </dgm:pt>
     <dgm:pt modelId="{EA70CE09-E446-4000-B373-3A86CBF5F9D8}" type="pres">
-      <dgm:prSet presAssocID="{1561AE6E-718F-4486-9C90-E7047C8B0C2D}" presName="connectorText" presStyleLbl="sibTrans1D1" presStyleIdx="5" presStyleCnt="9"/>
+      <dgm:prSet presAssocID="{1561AE6E-718F-4486-9C90-E7047C8B0C2D}" presName="connectorText" presStyleLbl="sibTrans1D1" presStyleIdx="5" presStyleCnt="10"/>
       <dgm:spPr/>
     </dgm:pt>
     <dgm:pt modelId="{089BE178-72F9-4A25-9FC8-54C43DE93C08}" type="pres">
-      <dgm:prSet presAssocID="{5F432864-D133-47FB-A29C-C07AF10B3385}" presName="node" presStyleLbl="node1" presStyleIdx="6" presStyleCnt="10">
+      <dgm:prSet presAssocID="{5F432864-D133-47FB-A29C-C07AF10B3385}" presName="node" presStyleLbl="node1" presStyleIdx="6" presStyleCnt="11">
         <dgm:presLayoutVars>
           <dgm:bulletEnabled val="1"/>
         </dgm:presLayoutVars>
@@ -1387,15 +1424,15 @@
       <dgm:spPr/>
     </dgm:pt>
     <dgm:pt modelId="{0DAA753D-3853-4648-B989-5731A3260B9D}" type="pres">
-      <dgm:prSet presAssocID="{E1B13D6D-02C2-4DAE-9C24-340E4EFEAAE0}" presName="sibTrans" presStyleLbl="sibTrans1D1" presStyleIdx="6" presStyleCnt="9"/>
+      <dgm:prSet presAssocID="{E1B13D6D-02C2-4DAE-9C24-340E4EFEAAE0}" presName="sibTrans" presStyleLbl="sibTrans1D1" presStyleIdx="6" presStyleCnt="10"/>
       <dgm:spPr/>
     </dgm:pt>
     <dgm:pt modelId="{DE1827BF-E904-4744-9E7F-251904B56D2E}" type="pres">
-      <dgm:prSet presAssocID="{E1B13D6D-02C2-4DAE-9C24-340E4EFEAAE0}" presName="connectorText" presStyleLbl="sibTrans1D1" presStyleIdx="6" presStyleCnt="9"/>
+      <dgm:prSet presAssocID="{E1B13D6D-02C2-4DAE-9C24-340E4EFEAAE0}" presName="connectorText" presStyleLbl="sibTrans1D1" presStyleIdx="6" presStyleCnt="10"/>
       <dgm:spPr/>
     </dgm:pt>
     <dgm:pt modelId="{34DCA1A9-E8FB-4A4B-A626-0A83BD566C7A}" type="pres">
-      <dgm:prSet presAssocID="{504B42D1-54EC-46F8-8281-608E4AAFBAC5}" presName="node" presStyleLbl="node1" presStyleIdx="7" presStyleCnt="10">
+      <dgm:prSet presAssocID="{504B42D1-54EC-46F8-8281-608E4AAFBAC5}" presName="node" presStyleLbl="node1" presStyleIdx="7" presStyleCnt="11">
         <dgm:presLayoutVars>
           <dgm:bulletEnabled val="1"/>
         </dgm:presLayoutVars>
@@ -1403,15 +1440,15 @@
       <dgm:spPr/>
     </dgm:pt>
     <dgm:pt modelId="{F199ADAF-6F17-4C00-90D5-0D0008506EDC}" type="pres">
-      <dgm:prSet presAssocID="{35B230B3-B0EA-42A1-9AAA-8FFABD07FD41}" presName="sibTrans" presStyleLbl="sibTrans1D1" presStyleIdx="7" presStyleCnt="9"/>
+      <dgm:prSet presAssocID="{35B230B3-B0EA-42A1-9AAA-8FFABD07FD41}" presName="sibTrans" presStyleLbl="sibTrans1D1" presStyleIdx="7" presStyleCnt="10"/>
       <dgm:spPr/>
     </dgm:pt>
     <dgm:pt modelId="{3395034E-CCEF-4741-A64F-A0E5339C6968}" type="pres">
-      <dgm:prSet presAssocID="{35B230B3-B0EA-42A1-9AAA-8FFABD07FD41}" presName="connectorText" presStyleLbl="sibTrans1D1" presStyleIdx="7" presStyleCnt="9"/>
+      <dgm:prSet presAssocID="{35B230B3-B0EA-42A1-9AAA-8FFABD07FD41}" presName="connectorText" presStyleLbl="sibTrans1D1" presStyleIdx="7" presStyleCnt="10"/>
       <dgm:spPr/>
     </dgm:pt>
     <dgm:pt modelId="{ACAD31DC-CF79-403D-BC5D-E10D1BDBECD5}" type="pres">
-      <dgm:prSet presAssocID="{830B72E5-BCBC-4486-8590-FB3EAF03AB59}" presName="node" presStyleLbl="node1" presStyleIdx="8" presStyleCnt="10">
+      <dgm:prSet presAssocID="{830B72E5-BCBC-4486-8590-FB3EAF03AB59}" presName="node" presStyleLbl="node1" presStyleIdx="8" presStyleCnt="11">
         <dgm:presLayoutVars>
           <dgm:bulletEnabled val="1"/>
         </dgm:presLayoutVars>
@@ -1419,15 +1456,31 @@
       <dgm:spPr/>
     </dgm:pt>
     <dgm:pt modelId="{6A3DF1A6-005D-4AB6-AE0C-8A51787BD450}" type="pres">
-      <dgm:prSet presAssocID="{59B0CC7E-6A4B-4FEA-9300-9A79AF785A9E}" presName="sibTrans" presStyleLbl="sibTrans1D1" presStyleIdx="8" presStyleCnt="9"/>
+      <dgm:prSet presAssocID="{59B0CC7E-6A4B-4FEA-9300-9A79AF785A9E}" presName="sibTrans" presStyleLbl="sibTrans1D1" presStyleIdx="8" presStyleCnt="10"/>
       <dgm:spPr/>
     </dgm:pt>
     <dgm:pt modelId="{0CE5F7DE-38C6-4833-8061-FD9815E143DA}" type="pres">
-      <dgm:prSet presAssocID="{59B0CC7E-6A4B-4FEA-9300-9A79AF785A9E}" presName="connectorText" presStyleLbl="sibTrans1D1" presStyleIdx="8" presStyleCnt="9"/>
+      <dgm:prSet presAssocID="{59B0CC7E-6A4B-4FEA-9300-9A79AF785A9E}" presName="connectorText" presStyleLbl="sibTrans1D1" presStyleIdx="8" presStyleCnt="10"/>
       <dgm:spPr/>
     </dgm:pt>
     <dgm:pt modelId="{FDBD4A80-9F78-44F5-A4AC-C7596419212B}" type="pres">
-      <dgm:prSet presAssocID="{AA0B91D5-5F2A-42C2-BFA3-549DE1BA0078}" presName="node" presStyleLbl="node1" presStyleIdx="9" presStyleCnt="10">
+      <dgm:prSet presAssocID="{AA0B91D5-5F2A-42C2-BFA3-549DE1BA0078}" presName="node" presStyleLbl="node1" presStyleIdx="9" presStyleCnt="11">
+        <dgm:presLayoutVars>
+          <dgm:bulletEnabled val="1"/>
+        </dgm:presLayoutVars>
+      </dgm:prSet>
+      <dgm:spPr/>
+    </dgm:pt>
+    <dgm:pt modelId="{06233ADC-64DE-4457-8B14-40D7C81AA67B}" type="pres">
+      <dgm:prSet presAssocID="{6A22CE8F-26CC-4ECE-A5F8-1C04B7789F3E}" presName="sibTrans" presStyleLbl="sibTrans1D1" presStyleIdx="9" presStyleCnt="10"/>
+      <dgm:spPr/>
+    </dgm:pt>
+    <dgm:pt modelId="{BDEF953E-B00D-4A6B-B9DB-B6170C6BE69A}" type="pres">
+      <dgm:prSet presAssocID="{6A22CE8F-26CC-4ECE-A5F8-1C04B7789F3E}" presName="connectorText" presStyleLbl="sibTrans1D1" presStyleIdx="9" presStyleCnt="10"/>
+      <dgm:spPr/>
+    </dgm:pt>
+    <dgm:pt modelId="{C8A34FCF-C0EC-408A-A086-99D8BDC18ED7}" type="pres">
+      <dgm:prSet presAssocID="{B6F2C99C-A5E7-4734-A85D-609DDFFD3A9F}" presName="node" presStyleLbl="node1" presStyleIdx="10" presStyleCnt="11">
         <dgm:presLayoutVars>
           <dgm:bulletEnabled val="1"/>
         </dgm:presLayoutVars>
@@ -1437,12 +1490,14 @@
   </dgm:ptLst>
   <dgm:cxnLst>
     <dgm:cxn modelId="{291EAA04-8EF6-4D2A-89F7-58A2D1360778}" type="presOf" srcId="{59B0CC7E-6A4B-4FEA-9300-9A79AF785A9E}" destId="{0CE5F7DE-38C6-4833-8061-FD9815E143DA}" srcOrd="1" destOrd="0" presId="urn:microsoft.com/office/officeart/2016/7/layout/RepeatingBendingProcessNew"/>
+    <dgm:cxn modelId="{B1814306-E350-43DC-96D7-1798714A6E6E}" type="presOf" srcId="{6A22CE8F-26CC-4ECE-A5F8-1C04B7789F3E}" destId="{BDEF953E-B00D-4A6B-B9DB-B6170C6BE69A}" srcOrd="1" destOrd="0" presId="urn:microsoft.com/office/officeart/2016/7/layout/RepeatingBendingProcessNew"/>
     <dgm:cxn modelId="{694B7507-7529-4C39-96ED-3543DCC8CDA8}" type="presOf" srcId="{830B72E5-BCBC-4486-8590-FB3EAF03AB59}" destId="{ACAD31DC-CF79-403D-BC5D-E10D1BDBECD5}" srcOrd="0" destOrd="0" presId="urn:microsoft.com/office/officeart/2016/7/layout/RepeatingBendingProcessNew"/>
     <dgm:cxn modelId="{F7931D0B-4746-4026-A45E-BA984DD8913E}" type="presOf" srcId="{59B0CC7E-6A4B-4FEA-9300-9A79AF785A9E}" destId="{6A3DF1A6-005D-4AB6-AE0C-8A51787BD450}" srcOrd="0" destOrd="0" presId="urn:microsoft.com/office/officeart/2016/7/layout/RepeatingBendingProcessNew"/>
     <dgm:cxn modelId="{8D0F370E-93FB-4A84-97C3-50F22A4CEC1F}" type="presOf" srcId="{8682AA7B-FE0D-453B-B768-DF3C7FC07090}" destId="{0B2A8F0F-46D4-4AF0-8239-9CA16BD5E92D}" srcOrd="0" destOrd="0" presId="urn:microsoft.com/office/officeart/2016/7/layout/RepeatingBendingProcessNew"/>
     <dgm:cxn modelId="{826D3C13-267D-430F-8A5A-476DAA00FCC6}" type="presOf" srcId="{32490ECE-B11C-4BDF-B6EA-40F8EE1CB894}" destId="{5E3CE6A5-F33F-4BFD-8D63-192764F860D4}" srcOrd="0" destOrd="0" presId="urn:microsoft.com/office/officeart/2016/7/layout/RepeatingBendingProcessNew"/>
     <dgm:cxn modelId="{E84AB516-A5E4-4527-B355-37A4E1764891}" srcId="{8933EB82-CD30-42F0-B705-08B4E7C4462A}" destId="{ABFC6990-E256-4718-A3FA-EAE5F7B70724}" srcOrd="1" destOrd="0" parTransId="{FF434249-D7D3-44D9-8D5C-9DEC7A10495A}" sibTransId="{238E7B91-22BF-454B-9805-4FE8FC04B3D9}"/>
     <dgm:cxn modelId="{E08AFA2E-0CB6-43AC-AF03-544CEFC86EFB}" type="presOf" srcId="{70AE54DD-BA3F-4073-98C1-72C99EE74D3C}" destId="{D279B056-5069-4CF7-B394-934A89EA551E}" srcOrd="0" destOrd="0" presId="urn:microsoft.com/office/officeart/2016/7/layout/RepeatingBendingProcessNew"/>
+    <dgm:cxn modelId="{34C4B72F-93E0-4D22-8E60-CC1473219EE8}" type="presOf" srcId="{6A22CE8F-26CC-4ECE-A5F8-1C04B7789F3E}" destId="{06233ADC-64DE-4457-8B14-40D7C81AA67B}" srcOrd="0" destOrd="0" presId="urn:microsoft.com/office/officeart/2016/7/layout/RepeatingBendingProcessNew"/>
     <dgm:cxn modelId="{04B2ED34-BEB5-42E2-ABDB-4633186B7537}" srcId="{8933EB82-CD30-42F0-B705-08B4E7C4462A}" destId="{504B42D1-54EC-46F8-8281-608E4AAFBAC5}" srcOrd="7" destOrd="0" parTransId="{2D09DD52-D7F9-4821-A0F1-96056FD2FD96}" sibTransId="{35B230B3-B0EA-42A1-9AAA-8FFABD07FD41}"/>
     <dgm:cxn modelId="{A33EBD3A-F503-4E2E-AFF4-E9EF231E5773}" type="presOf" srcId="{504B42D1-54EC-46F8-8281-608E4AAFBAC5}" destId="{34DCA1A9-E8FB-4A4B-A626-0A83BD566C7A}" srcOrd="0" destOrd="0" presId="urn:microsoft.com/office/officeart/2016/7/layout/RepeatingBendingProcessNew"/>
     <dgm:cxn modelId="{589E605E-193B-4214-96AE-F59BB3AA5B68}" srcId="{8933EB82-CD30-42F0-B705-08B4E7C4462A}" destId="{32490ECE-B11C-4BDF-B6EA-40F8EE1CB894}" srcOrd="5" destOrd="0" parTransId="{AD227DE2-9996-4669-AE86-35FBA3FEEF87}" sibTransId="{1561AE6E-718F-4486-9C90-E7047C8B0C2D}"/>
@@ -1459,6 +1514,7 @@
     <dgm:cxn modelId="{246AEDAA-9686-4A53-9DF1-35ACE49054C0}" type="presOf" srcId="{238E7B91-22BF-454B-9805-4FE8FC04B3D9}" destId="{131E8324-0824-4C70-BA3F-5C1F902DF9AB}" srcOrd="1" destOrd="0" presId="urn:microsoft.com/office/officeart/2016/7/layout/RepeatingBendingProcessNew"/>
     <dgm:cxn modelId="{662212AC-B5D2-4BCE-91C1-E27A4F064057}" srcId="{8933EB82-CD30-42F0-B705-08B4E7C4462A}" destId="{82FB9E83-8A52-48DC-B6C2-1A8F70B2E830}" srcOrd="3" destOrd="0" parTransId="{6FDA042E-2CDC-45AB-95E4-5CCEE689BEAC}" sibTransId="{18E28312-0EF9-4309-84EF-F5414D648520}"/>
     <dgm:cxn modelId="{19FE5AB1-8637-4D0B-98D6-8B792B95AE37}" type="presOf" srcId="{0DCAE78B-F242-4865-841F-A6538A1A5441}" destId="{636473E1-C855-4C90-AE7D-F9C986181807}" srcOrd="0" destOrd="0" presId="urn:microsoft.com/office/officeart/2016/7/layout/RepeatingBendingProcessNew"/>
+    <dgm:cxn modelId="{8DA4F5B1-B299-479F-9D4B-B2634FD5D964}" type="presOf" srcId="{B6F2C99C-A5E7-4734-A85D-609DDFFD3A9F}" destId="{C8A34FCF-C0EC-408A-A086-99D8BDC18ED7}" srcOrd="0" destOrd="0" presId="urn:microsoft.com/office/officeart/2016/7/layout/RepeatingBendingProcessNew"/>
     <dgm:cxn modelId="{F6AC5DB2-0710-4D11-89C0-8EAFF197BE4E}" type="presOf" srcId="{AA0B91D5-5F2A-42C2-BFA3-549DE1BA0078}" destId="{FDBD4A80-9F78-44F5-A4AC-C7596419212B}" srcOrd="0" destOrd="0" presId="urn:microsoft.com/office/officeart/2016/7/layout/RepeatingBendingProcessNew"/>
     <dgm:cxn modelId="{F6EA27B3-DC3B-4E33-B30B-351B05034FE7}" type="presOf" srcId="{44963C0E-8F7A-47AE-B286-D4F32BA530AC}" destId="{7418B14B-A8CA-48FD-BAAA-7A05B752976F}" srcOrd="1" destOrd="0" presId="urn:microsoft.com/office/officeart/2016/7/layout/RepeatingBendingProcessNew"/>
     <dgm:cxn modelId="{0FBA7EB6-8CEB-4AA3-A28C-58B655BFC7DB}" type="presOf" srcId="{0DCAE78B-F242-4865-841F-A6538A1A5441}" destId="{E7BFD4B9-5E0D-4988-9FD0-0828273E7B9E}" srcOrd="1" destOrd="0" presId="urn:microsoft.com/office/officeart/2016/7/layout/RepeatingBendingProcessNew"/>
@@ -1470,6 +1526,7 @@
     <dgm:cxn modelId="{2747E7D3-669A-47A9-96F7-C82870A099DB}" type="presOf" srcId="{18E28312-0EF9-4309-84EF-F5414D648520}" destId="{2C1EC30A-82B3-4E9B-A8D7-1070EB8DF4F0}" srcOrd="1" destOrd="0" presId="urn:microsoft.com/office/officeart/2016/7/layout/RepeatingBendingProcessNew"/>
     <dgm:cxn modelId="{F5C330D9-5BD2-4396-9642-1F4CEA8A763F}" type="presOf" srcId="{E1B13D6D-02C2-4DAE-9C24-340E4EFEAAE0}" destId="{0DAA753D-3853-4648-B989-5731A3260B9D}" srcOrd="0" destOrd="0" presId="urn:microsoft.com/office/officeart/2016/7/layout/RepeatingBendingProcessNew"/>
     <dgm:cxn modelId="{173989D9-538E-43A3-837E-AA05F6A3B294}" type="presOf" srcId="{35B230B3-B0EA-42A1-9AAA-8FFABD07FD41}" destId="{3395034E-CCEF-4741-A64F-A0E5339C6968}" srcOrd="1" destOrd="0" presId="urn:microsoft.com/office/officeart/2016/7/layout/RepeatingBendingProcessNew"/>
+    <dgm:cxn modelId="{B1E0A8E2-AC98-4FBA-9352-2AB25A28E2A4}" srcId="{8933EB82-CD30-42F0-B705-08B4E7C4462A}" destId="{B6F2C99C-A5E7-4734-A85D-609DDFFD3A9F}" srcOrd="10" destOrd="0" parTransId="{CEB7388F-ADA1-4981-8E95-9B9C862EEAF0}" sibTransId="{1BD5088B-B6B4-4795-A82D-B3E0760FC060}"/>
     <dgm:cxn modelId="{9DF63FE6-C65A-4483-B667-75A39DB9C953}" type="presOf" srcId="{B004AFBB-BE5E-4EC1-9499-A4BB2317EDD7}" destId="{DD9AEEE5-3EFA-4308-ACE7-3E0901EC9832}" srcOrd="0" destOrd="0" presId="urn:microsoft.com/office/officeart/2016/7/layout/RepeatingBendingProcessNew"/>
     <dgm:cxn modelId="{C278EDE8-A393-44E8-9CFB-BFDC8A9B19DE}" type="presOf" srcId="{8933EB82-CD30-42F0-B705-08B4E7C4462A}" destId="{C13C8027-67BA-46FE-AD70-CA5C99057C64}" srcOrd="0" destOrd="0" presId="urn:microsoft.com/office/officeart/2016/7/layout/RepeatingBendingProcessNew"/>
     <dgm:cxn modelId="{318771F2-1112-4902-9CA0-E15611E83400}" type="presOf" srcId="{70AE54DD-BA3F-4073-98C1-72C99EE74D3C}" destId="{66B18661-2952-42C6-8926-E8D9DD313FD0}" srcOrd="1" destOrd="0" presId="urn:microsoft.com/office/officeart/2016/7/layout/RepeatingBendingProcessNew"/>
@@ -1503,6 +1560,9 @@
     <dgm:cxn modelId="{D702EC71-FAAB-4407-9B87-9151F005A5A4}" type="presParOf" srcId="{C13C8027-67BA-46FE-AD70-CA5C99057C64}" destId="{6A3DF1A6-005D-4AB6-AE0C-8A51787BD450}" srcOrd="17" destOrd="0" presId="urn:microsoft.com/office/officeart/2016/7/layout/RepeatingBendingProcessNew"/>
     <dgm:cxn modelId="{3BC7D27E-8B23-4DCE-B148-E550FD803B77}" type="presParOf" srcId="{6A3DF1A6-005D-4AB6-AE0C-8A51787BD450}" destId="{0CE5F7DE-38C6-4833-8061-FD9815E143DA}" srcOrd="0" destOrd="0" presId="urn:microsoft.com/office/officeart/2016/7/layout/RepeatingBendingProcessNew"/>
     <dgm:cxn modelId="{9B08A8E2-D639-4EB7-922A-5CD9A4AE46CF}" type="presParOf" srcId="{C13C8027-67BA-46FE-AD70-CA5C99057C64}" destId="{FDBD4A80-9F78-44F5-A4AC-C7596419212B}" srcOrd="18" destOrd="0" presId="urn:microsoft.com/office/officeart/2016/7/layout/RepeatingBendingProcessNew"/>
+    <dgm:cxn modelId="{A467DD6B-1558-46F1-8C31-C6C421F8EB7D}" type="presParOf" srcId="{C13C8027-67BA-46FE-AD70-CA5C99057C64}" destId="{06233ADC-64DE-4457-8B14-40D7C81AA67B}" srcOrd="19" destOrd="0" presId="urn:microsoft.com/office/officeart/2016/7/layout/RepeatingBendingProcessNew"/>
+    <dgm:cxn modelId="{F0488FCD-CD82-4109-87EC-50BD1C425139}" type="presParOf" srcId="{06233ADC-64DE-4457-8B14-40D7C81AA67B}" destId="{BDEF953E-B00D-4A6B-B9DB-B6170C6BE69A}" srcOrd="0" destOrd="0" presId="urn:microsoft.com/office/officeart/2016/7/layout/RepeatingBendingProcessNew"/>
+    <dgm:cxn modelId="{B1791AF6-DA47-4B57-BE08-14DFE59D17F4}" type="presParOf" srcId="{C13C8027-67BA-46FE-AD70-CA5C99057C64}" destId="{C8A34FCF-C0EC-408A-A086-99D8BDC18ED7}" srcOrd="20" destOrd="0" presId="urn:microsoft.com/office/officeart/2016/7/layout/RepeatingBendingProcessNew"/>
   </dgm:cxnLst>
   <dgm:bg/>
   <dgm:whole/>
@@ -1827,10 +1887,10 @@
             <a:buNone/>
           </a:pPr>
           <a:r>
-            <a:rPr lang="fr-FR" sz="1800" kern="1200"/>
-            <a:t>Technologie utilisé</a:t>
+            <a:rPr lang="fr-FR" sz="1800" kern="1200" dirty="0"/>
+            <a:t>Technologies utilisées</a:t>
           </a:r>
-          <a:endParaRPr lang="en-US" sz="1800" kern="1200"/>
+          <a:endParaRPr lang="en-US" sz="1800" kern="1200" dirty="0"/>
         </a:p>
       </dsp:txBody>
       <dsp:txXfrm>
@@ -2787,10 +2847,10 @@
             <a:buNone/>
           </a:pPr>
           <a:r>
-            <a:rPr lang="fr-FR" sz="1800" kern="1200"/>
-            <a:t>Test du formulaire du particulier</a:t>
+            <a:rPr lang="fr-FR" sz="1800" kern="1200" dirty="0"/>
+            <a:t>Formulaire du particulier</a:t>
           </a:r>
-          <a:endParaRPr lang="en-US" sz="1800" kern="1200"/>
+          <a:endParaRPr lang="en-US" sz="1800" kern="1200" dirty="0"/>
         </a:p>
       </dsp:txBody>
       <dsp:txXfrm>
@@ -2946,7 +3006,7 @@
           </a:pPr>
           <a:r>
             <a:rPr lang="fr-FR" sz="1800" kern="1200" dirty="0"/>
-            <a:t>Test du formulaire du professionnel</a:t>
+            <a:t>Formulaire du professionnel</a:t>
           </a:r>
           <a:endParaRPr lang="en-US" sz="1800" kern="1200" dirty="0"/>
         </a:p>
@@ -2954,6 +3014,86 @@
       <dsp:txXfrm>
         <a:off x="1038537" y="2826752"/>
         <a:ext cx="1701775" cy="1021065"/>
+      </dsp:txXfrm>
+    </dsp:sp>
+    <dsp:sp modelId="{06233ADC-64DE-4457-8B14-40D7C81AA67B}">
+      <dsp:nvSpPr>
+        <dsp:cNvPr id="0" name=""/>
+        <dsp:cNvSpPr/>
+      </dsp:nvSpPr>
+      <dsp:spPr>
+        <a:xfrm>
+          <a:off x="4831695" y="3291565"/>
+          <a:ext cx="360808" cy="91440"/>
+        </a:xfrm>
+        <a:custGeom>
+          <a:avLst/>
+          <a:gdLst/>
+          <a:ahLst/>
+          <a:cxnLst/>
+          <a:rect l="0" t="0" r="0" b="0"/>
+          <a:pathLst>
+            <a:path>
+              <a:moveTo>
+                <a:pt x="0" y="45720"/>
+              </a:moveTo>
+              <a:lnTo>
+                <a:pt x="360808" y="45720"/>
+              </a:lnTo>
+            </a:path>
+          </a:pathLst>
+        </a:custGeom>
+        <a:noFill/>
+        <a:ln w="6350" cap="flat" cmpd="sng" algn="ctr">
+          <a:solidFill>
+            <a:schemeClr val="accent1">
+              <a:hueOff val="0"/>
+              <a:satOff val="0"/>
+              <a:lumOff val="0"/>
+              <a:alphaOff val="0"/>
+            </a:schemeClr>
+          </a:solidFill>
+          <a:prstDash val="solid"/>
+          <a:tailEnd type="arrow"/>
+        </a:ln>
+        <a:effectLst/>
+      </dsp:spPr>
+      <dsp:style>
+        <a:lnRef idx="1">
+          <a:scrgbClr r="0" g="0" b="0"/>
+        </a:lnRef>
+        <a:fillRef idx="0">
+          <a:scrgbClr r="0" g="0" b="0"/>
+        </a:fillRef>
+        <a:effectRef idx="0">
+          <a:scrgbClr r="0" g="0" b="0"/>
+        </a:effectRef>
+        <a:fontRef idx="minor"/>
+      </dsp:style>
+      <dsp:txBody>
+        <a:bodyPr spcFirstLastPara="0" vert="horz" wrap="square" lIns="12700" tIns="0" rIns="12700" bIns="0" numCol="1" spcCol="1270" anchor="ctr" anchorCtr="0">
+          <a:noAutofit/>
+        </a:bodyPr>
+        <a:lstStyle/>
+        <a:p>
+          <a:pPr marL="0" lvl="0" indent="0" algn="ctr" defTabSz="222250">
+            <a:lnSpc>
+              <a:spcPct val="90000"/>
+            </a:lnSpc>
+            <a:spcBef>
+              <a:spcPct val="0"/>
+            </a:spcBef>
+            <a:spcAft>
+              <a:spcPct val="35000"/>
+            </a:spcAft>
+            <a:buNone/>
+          </a:pPr>
+          <a:endParaRPr lang="en-US" sz="500" kern="1200"/>
+        </a:p>
+      </dsp:txBody>
+      <dsp:txXfrm>
+        <a:off x="5002314" y="3335328"/>
+        <a:ext cx="19570" cy="3914"/>
       </dsp:txXfrm>
     </dsp:sp>
     <dsp:sp modelId="{FDBD4A80-9F78-44F5-A4AC-C7596419212B}">
@@ -3024,13 +3164,91 @@
           </a:pPr>
           <a:r>
             <a:rPr lang="fr-FR" sz="1800" kern="1200" dirty="0"/>
+            <a:t>Récupération des clients</a:t>
+          </a:r>
+          <a:endParaRPr lang="en-US" sz="1800" kern="1200" dirty="0"/>
+        </a:p>
+      </dsp:txBody>
+      <dsp:txXfrm>
+        <a:off x="3131720" y="2826752"/>
+        <a:ext cx="1701775" cy="1021065"/>
+      </dsp:txXfrm>
+    </dsp:sp>
+    <dsp:sp modelId="{C8A34FCF-C0EC-408A-A086-99D8BDC18ED7}">
+      <dsp:nvSpPr>
+        <dsp:cNvPr id="0" name=""/>
+        <dsp:cNvSpPr/>
+      </dsp:nvSpPr>
+      <dsp:spPr>
+        <a:xfrm>
+          <a:off x="5224904" y="2826752"/>
+          <a:ext cx="1701775" cy="1021065"/>
+        </a:xfrm>
+        <a:prstGeom prst="rect">
+          <a:avLst/>
+        </a:prstGeom>
+        <a:solidFill>
+          <a:schemeClr val="accent1">
+            <a:hueOff val="0"/>
+            <a:satOff val="0"/>
+            <a:lumOff val="0"/>
+            <a:alphaOff val="0"/>
+          </a:schemeClr>
+        </a:solidFill>
+        <a:ln w="19050" cap="flat" cmpd="sng" algn="ctr">
+          <a:solidFill>
+            <a:schemeClr val="lt1">
+              <a:hueOff val="0"/>
+              <a:satOff val="0"/>
+              <a:lumOff val="0"/>
+              <a:alphaOff val="0"/>
+            </a:schemeClr>
+          </a:solidFill>
+          <a:prstDash val="solid"/>
+        </a:ln>
+        <a:effectLst/>
+      </dsp:spPr>
+      <dsp:style>
+        <a:lnRef idx="3">
+          <a:scrgbClr r="0" g="0" b="0"/>
+        </a:lnRef>
+        <a:fillRef idx="1">
+          <a:scrgbClr r="0" g="0" b="0"/>
+        </a:fillRef>
+        <a:effectRef idx="1">
+          <a:scrgbClr r="0" g="0" b="0"/>
+        </a:effectRef>
+        <a:fontRef idx="minor">
+          <a:schemeClr val="lt1"/>
+        </a:fontRef>
+      </dsp:style>
+      <dsp:txBody>
+        <a:bodyPr spcFirstLastPara="0" vert="horz" wrap="square" lIns="83388" tIns="87531" rIns="83388" bIns="87531" numCol="1" spcCol="1270" anchor="ctr" anchorCtr="0">
+          <a:noAutofit/>
+        </a:bodyPr>
+        <a:lstStyle/>
+        <a:p>
+          <a:pPr marL="0" lvl="0" indent="0" algn="ctr" defTabSz="800100">
+            <a:lnSpc>
+              <a:spcPct val="90000"/>
+            </a:lnSpc>
+            <a:spcBef>
+              <a:spcPct val="0"/>
+            </a:spcBef>
+            <a:spcAft>
+              <a:spcPct val="35000"/>
+            </a:spcAft>
+            <a:buNone/>
+          </a:pPr>
+          <a:r>
+            <a:rPr lang="fr-FR" sz="1800" kern="1200" dirty="0"/>
             <a:t>Conclusion</a:t>
           </a:r>
           <a:endParaRPr lang="en-US" sz="1800" kern="1200" dirty="0"/>
         </a:p>
       </dsp:txBody>
       <dsp:txXfrm>
-        <a:off x="3131720" y="2826752"/>
+        <a:off x="5224904" y="2826752"/>
         <a:ext cx="1701775" cy="1021065"/>
       </dsp:txXfrm>
     </dsp:sp>
@@ -9423,229 +9641,6 @@
           <a:chExt cx="0" cy="0"/>
         </a:xfrm>
       </p:grpSpPr>
-      <p:sp>
-        <p:nvSpPr>
-          <p:cNvPr id="2" name="Titre 1">
-            <a:extLst>
-              <a:ext uri="{FF2B5EF4-FFF2-40B4-BE49-F238E27FC236}">
-                <a16:creationId xmlns:a16="http://schemas.microsoft.com/office/drawing/2014/main" id="{4FDFCAD4-8F21-45BD-A1E0-8A1F3BFDB357}"/>
-              </a:ext>
-            </a:extLst>
-          </p:cNvPr>
-          <p:cNvSpPr>
-            <a:spLocks noGrp="1"/>
-          </p:cNvSpPr>
-          <p:nvPr>
-            <p:ph type="title"/>
-          </p:nvPr>
-        </p:nvSpPr>
-        <p:spPr>
-          <a:xfrm>
-            <a:off x="1066800" y="642594"/>
-            <a:ext cx="10058400" cy="1371600"/>
-          </a:xfrm>
-        </p:spPr>
-        <p:txBody>
-          <a:bodyPr anchor="ctr">
-            <a:normAutofit/>
-          </a:bodyPr>
-          <a:lstStyle/>
-          <a:p>
-            <a:r>
-              <a:rPr lang="fr-FR" dirty="0"/>
-              <a:t>Maquettage / interaction flow</a:t>
-            </a:r>
-          </a:p>
-        </p:txBody>
-      </p:sp>
-      <p:pic>
-        <p:nvPicPr>
-          <p:cNvPr id="4" name="Graphique 3">
-            <a:extLst>
-              <a:ext uri="{FF2B5EF4-FFF2-40B4-BE49-F238E27FC236}">
-                <a16:creationId xmlns:a16="http://schemas.microsoft.com/office/drawing/2014/main" id="{42242A9F-69FD-43EB-8A98-F648AB465CA0}"/>
-              </a:ext>
-            </a:extLst>
-          </p:cNvPr>
-          <p:cNvPicPr>
-            <a:picLocks noChangeAspect="1"/>
-          </p:cNvPicPr>
-          <p:nvPr/>
-        </p:nvPicPr>
-        <p:blipFill>
-          <a:blip r:embed="rId2">
-            <a:extLst>
-              <a:ext uri="{96DAC541-7B7A-43D3-8B79-37D633B846F1}">
-                <asvg:svgBlip xmlns:asvg="http://schemas.microsoft.com/office/drawing/2016/SVG/main" r:embed="rId3"/>
-              </a:ext>
-            </a:extLst>
-          </a:blip>
-          <a:stretch>
-            <a:fillRect/>
-          </a:stretch>
-        </p:blipFill>
-        <p:spPr>
-          <a:xfrm>
-            <a:off x="6467822" y="3485415"/>
-            <a:ext cx="4853319" cy="2729991"/>
-          </a:xfrm>
-          <a:prstGeom prst="rect">
-            <a:avLst/>
-          </a:prstGeom>
-        </p:spPr>
-      </p:pic>
-      <p:pic>
-        <p:nvPicPr>
-          <p:cNvPr id="5" name="Graphique 4">
-            <a:extLst>
-              <a:ext uri="{FF2B5EF4-FFF2-40B4-BE49-F238E27FC236}">
-                <a16:creationId xmlns:a16="http://schemas.microsoft.com/office/drawing/2014/main" id="{3BF666B2-A331-4240-9901-8F846242FDFD}"/>
-              </a:ext>
-            </a:extLst>
-          </p:cNvPr>
-          <p:cNvPicPr>
-            <a:picLocks noChangeAspect="1"/>
-          </p:cNvPicPr>
-          <p:nvPr/>
-        </p:nvPicPr>
-        <p:blipFill>
-          <a:blip r:embed="rId4">
-            <a:extLst>
-              <a:ext uri="{96DAC541-7B7A-43D3-8B79-37D633B846F1}">
-                <asvg:svgBlip xmlns:asvg="http://schemas.microsoft.com/office/drawing/2016/SVG/main" r:embed="rId5"/>
-              </a:ext>
-            </a:extLst>
-          </a:blip>
-          <a:stretch>
-            <a:fillRect/>
-          </a:stretch>
-        </p:blipFill>
-        <p:spPr>
-          <a:xfrm>
-            <a:off x="516298" y="2014194"/>
-            <a:ext cx="4853319" cy="2729992"/>
-          </a:xfrm>
-          <a:prstGeom prst="rect">
-            <a:avLst/>
-          </a:prstGeom>
-        </p:spPr>
-      </p:pic>
-    </p:spTree>
-    <p:extLst>
-      <p:ext uri="{BB962C8B-B14F-4D97-AF65-F5344CB8AC3E}">
-        <p14:creationId xmlns:p14="http://schemas.microsoft.com/office/powerpoint/2010/main" val="2676148001"/>
-      </p:ext>
-    </p:extLst>
-  </p:cSld>
-  <p:clrMapOvr>
-    <a:masterClrMapping/>
-  </p:clrMapOvr>
-  <p:transition spd="slow">
-    <p:push dir="u"/>
-  </p:transition>
-  <p:timing>
-    <p:tnLst>
-      <p:par>
-        <p:cTn id="1" dur="indefinite" restart="never" nodeType="tmRoot">
-          <p:childTnLst>
-            <p:seq concurrent="1" nextAc="seek">
-              <p:cTn id="2" dur="indefinite" nodeType="mainSeq">
-                <p:childTnLst>
-                  <p:par>
-                    <p:cTn id="3" fill="hold">
-                      <p:stCondLst>
-                        <p:cond delay="indefinite"/>
-                      </p:stCondLst>
-                      <p:childTnLst>
-                        <p:par>
-                          <p:cTn id="4" fill="hold">
-                            <p:stCondLst>
-                              <p:cond delay="0"/>
-                            </p:stCondLst>
-                            <p:childTnLst>
-                              <p:par>
-                                <p:cTn id="5" presetID="10" presetClass="entr" presetSubtype="0" fill="hold" nodeType="clickEffect">
-                                  <p:stCondLst>
-                                    <p:cond delay="0"/>
-                                  </p:stCondLst>
-                                  <p:childTnLst>
-                                    <p:set>
-                                      <p:cBhvr>
-                                        <p:cTn id="6" dur="1" fill="hold">
-                                          <p:stCondLst>
-                                            <p:cond delay="0"/>
-                                          </p:stCondLst>
-                                        </p:cTn>
-                                        <p:tgtEl>
-                                          <p:spTgt spid="4"/>
-                                        </p:tgtEl>
-                                        <p:attrNameLst>
-                                          <p:attrName>style.visibility</p:attrName>
-                                        </p:attrNameLst>
-                                      </p:cBhvr>
-                                      <p:to>
-                                        <p:strVal val="visible"/>
-                                      </p:to>
-                                    </p:set>
-                                    <p:animEffect transition="in" filter="fade">
-                                      <p:cBhvr>
-                                        <p:cTn id="7" dur="500"/>
-                                        <p:tgtEl>
-                                          <p:spTgt spid="4"/>
-                                        </p:tgtEl>
-                                      </p:cBhvr>
-                                    </p:animEffect>
-                                  </p:childTnLst>
-                                </p:cTn>
-                              </p:par>
-                            </p:childTnLst>
-                          </p:cTn>
-                        </p:par>
-                      </p:childTnLst>
-                    </p:cTn>
-                  </p:par>
-                </p:childTnLst>
-              </p:cTn>
-              <p:prevCondLst>
-                <p:cond evt="onPrev" delay="0">
-                  <p:tgtEl>
-                    <p:sldTgt/>
-                  </p:tgtEl>
-                </p:cond>
-              </p:prevCondLst>
-              <p:nextCondLst>
-                <p:cond evt="onNext" delay="0">
-                  <p:tgtEl>
-                    <p:sldTgt/>
-                  </p:tgtEl>
-                </p:cond>
-              </p:nextCondLst>
-            </p:seq>
-          </p:childTnLst>
-        </p:cTn>
-      </p:par>
-    </p:tnLst>
-  </p:timing>
-</p:sld>
-</file>
-
-<file path=ppt/slides/slide11.xml><?xml version="1.0" encoding="utf-8"?>
-<p:sld xmlns:a="http://schemas.openxmlformats.org/drawingml/2006/main" xmlns:r="http://schemas.openxmlformats.org/officeDocument/2006/relationships" xmlns:p="http://schemas.openxmlformats.org/presentationml/2006/main">
-  <p:cSld>
-    <p:spTree>
-      <p:nvGrpSpPr>
-        <p:cNvPr id="1" name=""/>
-        <p:cNvGrpSpPr/>
-        <p:nvPr/>
-      </p:nvGrpSpPr>
-      <p:grpSpPr>
-        <a:xfrm>
-          <a:off x="0" y="0"/>
-          <a:ext cx="0" cy="0"/>
-          <a:chOff x="0" y="0"/>
-          <a:chExt cx="0" cy="0"/>
-        </a:xfrm>
-      </p:grpSpPr>
       <p:pic>
         <p:nvPicPr>
           <p:cNvPr id="9" name="Graphique 8">
@@ -9826,7 +9821,7 @@
 </p:sld>
 </file>
 
-<file path=ppt/slides/slide12.xml><?xml version="1.0" encoding="utf-8"?>
+<file path=ppt/slides/slide11.xml><?xml version="1.0" encoding="utf-8"?>
 <p:sld xmlns:a="http://schemas.openxmlformats.org/drawingml/2006/main" xmlns:r="http://schemas.openxmlformats.org/officeDocument/2006/relationships" xmlns:p="http://schemas.openxmlformats.org/presentationml/2006/main">
   <p:cSld>
     <p:spTree>
@@ -9904,7 +9899,7 @@
 </p:sld>
 </file>
 
-<file path=ppt/slides/slide13.xml><?xml version="1.0" encoding="utf-8"?>
+<file path=ppt/slides/slide12.xml><?xml version="1.0" encoding="utf-8"?>
 <p:sld xmlns:a="http://schemas.openxmlformats.org/drawingml/2006/main" xmlns:r="http://schemas.openxmlformats.org/officeDocument/2006/relationships" xmlns:p="http://schemas.openxmlformats.org/presentationml/2006/main">
   <p:cSld>
     <p:spTree>
@@ -9982,7 +9977,7 @@
 </p:sld>
 </file>
 
-<file path=ppt/slides/slide14.xml><?xml version="1.0" encoding="utf-8"?>
+<file path=ppt/slides/slide13.xml><?xml version="1.0" encoding="utf-8"?>
 <p:sld xmlns:a="http://schemas.openxmlformats.org/drawingml/2006/main" xmlns:r="http://schemas.openxmlformats.org/officeDocument/2006/relationships" xmlns:p="http://schemas.openxmlformats.org/presentationml/2006/main">
   <p:cSld>
     <p:spTree>
@@ -10060,7 +10055,7 @@
 </p:sld>
 </file>
 
-<file path=ppt/slides/slide15.xml><?xml version="1.0" encoding="utf-8"?>
+<file path=ppt/slides/slide14.xml><?xml version="1.0" encoding="utf-8"?>
 <p:sld xmlns:a="http://schemas.openxmlformats.org/drawingml/2006/main" xmlns:r="http://schemas.openxmlformats.org/officeDocument/2006/relationships" xmlns:p="http://schemas.openxmlformats.org/presentationml/2006/main">
   <p:cSld>
     <p:spTree>
@@ -10138,7 +10133,7 @@
 </p:sld>
 </file>
 
-<file path=ppt/slides/slide16.xml><?xml version="1.0" encoding="utf-8"?>
+<file path=ppt/slides/slide15.xml><?xml version="1.0" encoding="utf-8"?>
 <p:sld xmlns:a="http://schemas.openxmlformats.org/drawingml/2006/main" xmlns:r="http://schemas.openxmlformats.org/officeDocument/2006/relationships" xmlns:p="http://schemas.openxmlformats.org/presentationml/2006/main">
   <p:cSld>
     <p:spTree>
@@ -10335,7 +10330,7 @@
 </p:sld>
 </file>
 
-<file path=ppt/slides/slide17.xml><?xml version="1.0" encoding="utf-8"?>
+<file path=ppt/slides/slide16.xml><?xml version="1.0" encoding="utf-8"?>
 <p:sld xmlns:a="http://schemas.openxmlformats.org/drawingml/2006/main" xmlns:r="http://schemas.openxmlformats.org/officeDocument/2006/relationships" xmlns:p="http://schemas.openxmlformats.org/presentationml/2006/main">
   <p:cSld>
     <p:spTree>
@@ -10665,7 +10660,7 @@
 </p:sld>
 </file>
 
-<file path=ppt/slides/slide18.xml><?xml version="1.0" encoding="utf-8"?>
+<file path=ppt/slides/slide17.xml><?xml version="1.0" encoding="utf-8"?>
 <p:sld xmlns:a="http://schemas.openxmlformats.org/drawingml/2006/main" xmlns:r="http://schemas.openxmlformats.org/officeDocument/2006/relationships" xmlns:p="http://schemas.openxmlformats.org/presentationml/2006/main">
   <p:cSld>
     <p:spTree>
@@ -10697,7 +10692,7 @@
           <p:nvPr>
             <p:extLst>
               <p:ext uri="{D42A27DB-BD31-4B8C-83A1-F6EECF244321}">
-                <p14:modId xmlns:p14="http://schemas.microsoft.com/office/powerpoint/2010/main" val="1426290912"/>
+                <p14:modId xmlns:p14="http://schemas.microsoft.com/office/powerpoint/2010/main" val="3275132578"/>
               </p:ext>
             </p:extLst>
           </p:nvPr>
@@ -10986,7 +10981,7 @@
                             <a:srgbClr val="FF0000"/>
                           </a:solidFill>
                         </a:rPr>
-                        <a:t>-</a:t>
+                        <a:t>samdu59@gmail.com</a:t>
                       </a:r>
                     </a:p>
                   </a:txBody>
@@ -11036,7 +11031,7 @@
 </p:sld>
 </file>
 
-<file path=ppt/slides/slide19.xml><?xml version="1.0" encoding="utf-8"?>
+<file path=ppt/slides/slide18.xml><?xml version="1.0" encoding="utf-8"?>
 <p:sld xmlns:a="http://schemas.openxmlformats.org/drawingml/2006/main" xmlns:r="http://schemas.openxmlformats.org/officeDocument/2006/relationships" xmlns:p="http://schemas.openxmlformats.org/presentationml/2006/main">
   <p:cSld>
     <p:spTree>
@@ -11099,14 +11094,14 @@
             <p:ph idx="1"/>
             <p:extLst>
               <p:ext uri="{D42A27DB-BD31-4B8C-83A1-F6EECF244321}">
-                <p14:modId xmlns:p14="http://schemas.microsoft.com/office/powerpoint/2010/main" val="233527219"/>
+                <p14:modId xmlns:p14="http://schemas.microsoft.com/office/powerpoint/2010/main" val="3889418046"/>
               </p:ext>
             </p:extLst>
           </p:nvPr>
         </p:nvGraphicFramePr>
         <p:xfrm>
           <a:off x="1066800" y="2103438"/>
-          <a:ext cx="10058400" cy="2199640"/>
+          <a:ext cx="10058400" cy="2748280"/>
         </p:xfrm>
         <a:graphic>
           <a:graphicData uri="http://schemas.openxmlformats.org/drawingml/2006/table">
@@ -11267,9 +11262,25 @@
                     <a:lstStyle/>
                     <a:p>
                       <a:r>
-                        <a:rPr lang="fr-FR" dirty="0"/>
-                        <a:t>553d2066-ff19-42dc-b08e-c8ed676e8d3b</a:t>
+                        <a:rPr lang="fr-FR" dirty="0">
+                          <a:solidFill>
+                            <a:schemeClr val="tx1"/>
+                          </a:solidFill>
+                          <a:hlinkClick r:id="rId3">
+                            <a:extLst>
+                              <a:ext uri="{A12FA001-AC4F-418D-AE19-62706E023703}">
+                                <ahyp:hlinkClr xmlns:ahyp="http://schemas.microsoft.com/office/drawing/2018/hyperlinkcolor" val="tx"/>
+                              </a:ext>
+                            </a:extLst>
+                          </a:hlinkClick>
+                        </a:rPr>
+                        <a:t>http://localhost/AP2019_Projet002_projetWEB/?q=553d2066-ff19-42dc-b08e-c8ed676e8d3b</a:t>
                       </a:r>
+                      <a:endParaRPr lang="fr-FR" dirty="0">
+                        <a:solidFill>
+                          <a:schemeClr val="tx1"/>
+                        </a:solidFill>
+                      </a:endParaRPr>
                     </a:p>
                   </a:txBody>
                   <a:tcPr anchor="ctr"/>
@@ -11328,106 +11339,7 @@
 </p:sld>
 </file>
 
-<file path=ppt/slides/slide2.xml><?xml version="1.0" encoding="utf-8"?>
-<p:sld xmlns:a="http://schemas.openxmlformats.org/drawingml/2006/main" xmlns:r="http://schemas.openxmlformats.org/officeDocument/2006/relationships" xmlns:p="http://schemas.openxmlformats.org/presentationml/2006/main">
-  <p:cSld>
-    <p:spTree>
-      <p:nvGrpSpPr>
-        <p:cNvPr id="1" name=""/>
-        <p:cNvGrpSpPr/>
-        <p:nvPr/>
-      </p:nvGrpSpPr>
-      <p:grpSpPr>
-        <a:xfrm>
-          <a:off x="0" y="0"/>
-          <a:ext cx="0" cy="0"/>
-          <a:chOff x="0" y="0"/>
-          <a:chExt cx="0" cy="0"/>
-        </a:xfrm>
-      </p:grpSpPr>
-      <p:sp>
-        <p:nvSpPr>
-          <p:cNvPr id="2" name="Titre 1">
-            <a:extLst>
-              <a:ext uri="{FF2B5EF4-FFF2-40B4-BE49-F238E27FC236}">
-                <a16:creationId xmlns:a16="http://schemas.microsoft.com/office/drawing/2014/main" id="{981AFB18-DDAB-4818-B40D-ABBD38250D9F}"/>
-              </a:ext>
-            </a:extLst>
-          </p:cNvPr>
-          <p:cNvSpPr>
-            <a:spLocks noGrp="1"/>
-          </p:cNvSpPr>
-          <p:nvPr>
-            <p:ph type="title"/>
-          </p:nvPr>
-        </p:nvSpPr>
-        <p:spPr>
-          <a:xfrm>
-            <a:off x="1066800" y="642594"/>
-            <a:ext cx="10058400" cy="1371600"/>
-          </a:xfrm>
-        </p:spPr>
-        <p:txBody>
-          <a:bodyPr anchor="ctr">
-            <a:normAutofit/>
-          </a:bodyPr>
-          <a:lstStyle/>
-          <a:p>
-            <a:r>
-              <a:rPr lang="fr-FR" dirty="0"/>
-              <a:t>Sommaire</a:t>
-            </a:r>
-          </a:p>
-        </p:txBody>
-      </p:sp>
-      <p:graphicFrame>
-        <p:nvGraphicFramePr>
-          <p:cNvPr id="12" name="Espace réservé du contenu 2">
-            <a:extLst>
-              <a:ext uri="{FF2B5EF4-FFF2-40B4-BE49-F238E27FC236}">
-                <a16:creationId xmlns:a16="http://schemas.microsoft.com/office/drawing/2014/main" id="{C1FECE5A-6EED-4A4F-A6E0-74E346EAE1A6}"/>
-              </a:ext>
-            </a:extLst>
-          </p:cNvPr>
-          <p:cNvGraphicFramePr>
-            <a:graphicFrameLocks noGrp="1"/>
-          </p:cNvGraphicFramePr>
-          <p:nvPr>
-            <p:ph idx="1"/>
-            <p:extLst>
-              <p:ext uri="{D42A27DB-BD31-4B8C-83A1-F6EECF244321}">
-                <p14:modId xmlns:p14="http://schemas.microsoft.com/office/powerpoint/2010/main" val="48972931"/>
-              </p:ext>
-            </p:extLst>
-          </p:nvPr>
-        </p:nvGraphicFramePr>
-        <p:xfrm>
-          <a:off x="1066800" y="2103120"/>
-          <a:ext cx="10058400" cy="3849624"/>
-        </p:xfrm>
-        <a:graphic>
-          <a:graphicData uri="http://schemas.openxmlformats.org/drawingml/2006/diagram">
-            <dgm:relIds xmlns:dgm="http://schemas.openxmlformats.org/drawingml/2006/diagram" xmlns:r="http://schemas.openxmlformats.org/officeDocument/2006/relationships" r:dm="rId2" r:lo="rId3" r:qs="rId4" r:cs="rId5"/>
-          </a:graphicData>
-        </a:graphic>
-      </p:graphicFrame>
-    </p:spTree>
-    <p:extLst>
-      <p:ext uri="{BB962C8B-B14F-4D97-AF65-F5344CB8AC3E}">
-        <p14:creationId xmlns:p14="http://schemas.microsoft.com/office/powerpoint/2010/main" val="620010735"/>
-      </p:ext>
-    </p:extLst>
-  </p:cSld>
-  <p:clrMapOvr>
-    <a:masterClrMapping/>
-  </p:clrMapOvr>
-  <p:transition spd="slow">
-    <p:push dir="u"/>
-  </p:transition>
-</p:sld>
-</file>
-
-<file path=ppt/slides/slide20.xml><?xml version="1.0" encoding="utf-8"?>
+<file path=ppt/slides/slide19.xml><?xml version="1.0" encoding="utf-8"?>
 <p:sld xmlns:a="http://schemas.openxmlformats.org/drawingml/2006/main" xmlns:r="http://schemas.openxmlformats.org/officeDocument/2006/relationships" xmlns:p="http://schemas.openxmlformats.org/presentationml/2006/main">
   <p:cSld>
     <p:spTree>
@@ -11460,7 +11372,7 @@
             <p:ph idx="1"/>
             <p:extLst>
               <p:ext uri="{D42A27DB-BD31-4B8C-83A1-F6EECF244321}">
-                <p14:modId xmlns:p14="http://schemas.microsoft.com/office/powerpoint/2010/main" val="3566198891"/>
+                <p14:modId xmlns:p14="http://schemas.microsoft.com/office/powerpoint/2010/main" val="1359239296"/>
               </p:ext>
             </p:extLst>
           </p:nvPr>
@@ -11726,7 +11638,7 @@
                             <a:srgbClr val="FF0000"/>
                           </a:solidFill>
                         </a:rPr>
-                        <a:t>-</a:t>
+                        <a:t>lepatron@societe.com</a:t>
                       </a:r>
                     </a:p>
                   </a:txBody>
@@ -11772,6 +11684,303 @@
   </p:clrMapOvr>
   <p:transition spd="slow">
     <p:wipe/>
+  </p:transition>
+</p:sld>
+</file>
+
+<file path=ppt/slides/slide2.xml><?xml version="1.0" encoding="utf-8"?>
+<p:sld xmlns:a="http://schemas.openxmlformats.org/drawingml/2006/main" xmlns:r="http://schemas.openxmlformats.org/officeDocument/2006/relationships" xmlns:p="http://schemas.openxmlformats.org/presentationml/2006/main">
+  <p:cSld>
+    <p:spTree>
+      <p:nvGrpSpPr>
+        <p:cNvPr id="1" name=""/>
+        <p:cNvGrpSpPr/>
+        <p:nvPr/>
+      </p:nvGrpSpPr>
+      <p:grpSpPr>
+        <a:xfrm>
+          <a:off x="0" y="0"/>
+          <a:ext cx="0" cy="0"/>
+          <a:chOff x="0" y="0"/>
+          <a:chExt cx="0" cy="0"/>
+        </a:xfrm>
+      </p:grpSpPr>
+      <p:sp>
+        <p:nvSpPr>
+          <p:cNvPr id="2" name="Titre 1">
+            <a:extLst>
+              <a:ext uri="{FF2B5EF4-FFF2-40B4-BE49-F238E27FC236}">
+                <a16:creationId xmlns:a16="http://schemas.microsoft.com/office/drawing/2014/main" id="{981AFB18-DDAB-4818-B40D-ABBD38250D9F}"/>
+              </a:ext>
+            </a:extLst>
+          </p:cNvPr>
+          <p:cNvSpPr>
+            <a:spLocks noGrp="1"/>
+          </p:cNvSpPr>
+          <p:nvPr>
+            <p:ph type="title"/>
+          </p:nvPr>
+        </p:nvSpPr>
+        <p:spPr>
+          <a:xfrm>
+            <a:off x="1066800" y="642594"/>
+            <a:ext cx="10058400" cy="1371600"/>
+          </a:xfrm>
+        </p:spPr>
+        <p:txBody>
+          <a:bodyPr anchor="ctr">
+            <a:normAutofit/>
+          </a:bodyPr>
+          <a:lstStyle/>
+          <a:p>
+            <a:r>
+              <a:rPr lang="fr-FR" dirty="0"/>
+              <a:t>Sommaire</a:t>
+            </a:r>
+          </a:p>
+        </p:txBody>
+      </p:sp>
+      <p:graphicFrame>
+        <p:nvGraphicFramePr>
+          <p:cNvPr id="12" name="Espace réservé du contenu 2">
+            <a:extLst>
+              <a:ext uri="{FF2B5EF4-FFF2-40B4-BE49-F238E27FC236}">
+                <a16:creationId xmlns:a16="http://schemas.microsoft.com/office/drawing/2014/main" id="{C1FECE5A-6EED-4A4F-A6E0-74E346EAE1A6}"/>
+              </a:ext>
+            </a:extLst>
+          </p:cNvPr>
+          <p:cNvGraphicFramePr>
+            <a:graphicFrameLocks noGrp="1"/>
+          </p:cNvGraphicFramePr>
+          <p:nvPr>
+            <p:ph idx="1"/>
+            <p:extLst>
+              <p:ext uri="{D42A27DB-BD31-4B8C-83A1-F6EECF244321}">
+                <p14:modId xmlns:p14="http://schemas.microsoft.com/office/powerpoint/2010/main" val="2348726924"/>
+              </p:ext>
+            </p:extLst>
+          </p:nvPr>
+        </p:nvGraphicFramePr>
+        <p:xfrm>
+          <a:off x="1066800" y="2103120"/>
+          <a:ext cx="10058400" cy="3849624"/>
+        </p:xfrm>
+        <a:graphic>
+          <a:graphicData uri="http://schemas.openxmlformats.org/drawingml/2006/diagram">
+            <dgm:relIds xmlns:dgm="http://schemas.openxmlformats.org/drawingml/2006/diagram" xmlns:r="http://schemas.openxmlformats.org/officeDocument/2006/relationships" r:dm="rId2" r:lo="rId3" r:qs="rId4" r:cs="rId5"/>
+          </a:graphicData>
+        </a:graphic>
+      </p:graphicFrame>
+    </p:spTree>
+    <p:extLst>
+      <p:ext uri="{BB962C8B-B14F-4D97-AF65-F5344CB8AC3E}">
+        <p14:creationId xmlns:p14="http://schemas.microsoft.com/office/powerpoint/2010/main" val="620010735"/>
+      </p:ext>
+    </p:extLst>
+  </p:cSld>
+  <p:clrMapOvr>
+    <a:masterClrMapping/>
+  </p:clrMapOvr>
+  <p:transition spd="slow">
+    <p:push dir="u"/>
+  </p:transition>
+</p:sld>
+</file>
+
+<file path=ppt/slides/slide20.xml><?xml version="1.0" encoding="utf-8"?>
+<p:sld xmlns:a="http://schemas.openxmlformats.org/drawingml/2006/main" xmlns:r="http://schemas.openxmlformats.org/officeDocument/2006/relationships" xmlns:p="http://schemas.openxmlformats.org/presentationml/2006/main">
+  <p:cSld>
+    <p:spTree>
+      <p:nvGrpSpPr>
+        <p:cNvPr id="1" name=""/>
+        <p:cNvGrpSpPr/>
+        <p:nvPr/>
+      </p:nvGrpSpPr>
+      <p:grpSpPr>
+        <a:xfrm>
+          <a:off x="0" y="0"/>
+          <a:ext cx="0" cy="0"/>
+          <a:chOff x="0" y="0"/>
+          <a:chExt cx="0" cy="0"/>
+        </a:xfrm>
+      </p:grpSpPr>
+      <p:sp>
+        <p:nvSpPr>
+          <p:cNvPr id="2" name="Titre 1">
+            <a:extLst>
+              <a:ext uri="{FF2B5EF4-FFF2-40B4-BE49-F238E27FC236}">
+                <a16:creationId xmlns:a16="http://schemas.microsoft.com/office/drawing/2014/main" id="{8B225CE4-4639-4948-A8FC-56AAC2765001}"/>
+              </a:ext>
+            </a:extLst>
+          </p:cNvPr>
+          <p:cNvSpPr>
+            <a:spLocks noGrp="1"/>
+          </p:cNvSpPr>
+          <p:nvPr>
+            <p:ph type="title"/>
+          </p:nvPr>
+        </p:nvSpPr>
+        <p:spPr/>
+        <p:txBody>
+          <a:bodyPr/>
+          <a:lstStyle/>
+          <a:p>
+            <a:r>
+              <a:rPr lang="fr-FR" dirty="0"/>
+              <a:t>Récupération des clients</a:t>
+            </a:r>
+          </a:p>
+        </p:txBody>
+      </p:sp>
+      <p:sp>
+        <p:nvSpPr>
+          <p:cNvPr id="3" name="Espace réservé du contenu 2">
+            <a:extLst>
+              <a:ext uri="{FF2B5EF4-FFF2-40B4-BE49-F238E27FC236}">
+                <a16:creationId xmlns:a16="http://schemas.microsoft.com/office/drawing/2014/main" id="{91BA0CCD-A56A-40D7-95FF-2104D8D6B2F8}"/>
+              </a:ext>
+            </a:extLst>
+          </p:cNvPr>
+          <p:cNvSpPr>
+            <a:spLocks noGrp="1"/>
+          </p:cNvSpPr>
+          <p:nvPr>
+            <p:ph idx="1"/>
+          </p:nvPr>
+        </p:nvSpPr>
+        <p:spPr/>
+        <p:txBody>
+          <a:bodyPr>
+            <a:normAutofit/>
+          </a:bodyPr>
+          <a:lstStyle/>
+          <a:p>
+            <a:r>
+              <a:rPr lang="fr-FR" sz="2000" b="1" dirty="0"/>
+              <a:t>Pour les derniers clients :</a:t>
+            </a:r>
+            <a:endParaRPr lang="fr-FR" sz="2000" b="1" dirty="0">
+              <a:solidFill>
+                <a:srgbClr val="00B0F0"/>
+              </a:solidFill>
+              <a:hlinkClick r:id="rId2">
+                <a:extLst>
+                  <a:ext uri="{A12FA001-AC4F-418D-AE19-62706E023703}">
+                    <ahyp:hlinkClr xmlns:ahyp="http://schemas.microsoft.com/office/drawing/2018/hyperlinkcolor" val="tx"/>
+                  </a:ext>
+                </a:extLst>
+              </a:hlinkClick>
+            </a:endParaRPr>
+          </a:p>
+          <a:p>
+            <a:pPr lvl="1"/>
+            <a:r>
+              <a:rPr lang="fr-FR" sz="1800" dirty="0">
+                <a:hlinkClick r:id="rId2">
+                  <a:extLst>
+                    <a:ext uri="{A12FA001-AC4F-418D-AE19-62706E023703}">
+                      <ahyp:hlinkClr xmlns:ahyp="http://schemas.microsoft.com/office/drawing/2018/hyperlinkcolor" val="tx"/>
+                    </a:ext>
+                  </a:extLst>
+                </a:hlinkClick>
+              </a:rPr>
+              <a:t>http://localhost/AP2019_Projet002_projetWEB/recuperationClients/edition_xml.php</a:t>
+            </a:r>
+            <a:endParaRPr lang="fr-FR" sz="1800" dirty="0"/>
+          </a:p>
+          <a:p>
+            <a:pPr lvl="1"/>
+            <a:r>
+              <a:rPr lang="fr-FR" sz="1800" dirty="0">
+                <a:hlinkClick r:id="rId3">
+                  <a:extLst>
+                    <a:ext uri="{A12FA001-AC4F-418D-AE19-62706E023703}">
+                      <ahyp:hlinkClr xmlns:ahyp="http://schemas.microsoft.com/office/drawing/2018/hyperlinkcolor" val="tx"/>
+                    </a:ext>
+                  </a:extLst>
+                </a:hlinkClick>
+              </a:rPr>
+              <a:t>http://localhost\AP2019_Projet002_projetWEB\recuperationClients\formualire.xml</a:t>
+            </a:r>
+            <a:endParaRPr lang="fr-FR" sz="1800" dirty="0"/>
+          </a:p>
+          <a:p>
+            <a:endParaRPr lang="fr-FR" sz="2000" dirty="0">
+              <a:hlinkClick r:id="rId4"/>
+            </a:endParaRPr>
+          </a:p>
+          <a:p>
+            <a:r>
+              <a:rPr lang="fr-FR" sz="2000" b="1" dirty="0"/>
+              <a:t>Pour tous les clients :</a:t>
+            </a:r>
+            <a:endParaRPr lang="fr-FR" sz="2000" b="1" dirty="0">
+              <a:solidFill>
+                <a:srgbClr val="00B0F0"/>
+              </a:solidFill>
+              <a:hlinkClick r:id="rId4">
+                <a:extLst>
+                  <a:ext uri="{A12FA001-AC4F-418D-AE19-62706E023703}">
+                    <ahyp:hlinkClr xmlns:ahyp="http://schemas.microsoft.com/office/drawing/2018/hyperlinkcolor" val="tx"/>
+                  </a:ext>
+                </a:extLst>
+              </a:hlinkClick>
+            </a:endParaRPr>
+          </a:p>
+          <a:p>
+            <a:pPr lvl="1"/>
+            <a:r>
+              <a:rPr lang="fr-FR" sz="1800" dirty="0">
+                <a:hlinkClick r:id="rId4">
+                  <a:extLst>
+                    <a:ext uri="{A12FA001-AC4F-418D-AE19-62706E023703}">
+                      <ahyp:hlinkClr xmlns:ahyp="http://schemas.microsoft.com/office/drawing/2018/hyperlinkcolor" val="tx"/>
+                    </a:ext>
+                  </a:extLst>
+                </a:hlinkClick>
+              </a:rPr>
+              <a:t>http://localhost/AP2019_Projet002_projetWEB/recuperationClients/recup_globale.php</a:t>
+            </a:r>
+            <a:endParaRPr lang="fr-FR" sz="1800" dirty="0"/>
+          </a:p>
+          <a:p>
+            <a:pPr lvl="1"/>
+            <a:r>
+              <a:rPr lang="fr-FR" sz="1800" dirty="0">
+                <a:hlinkClick r:id="rId5">
+                  <a:extLst>
+                    <a:ext uri="{A12FA001-AC4F-418D-AE19-62706E023703}">
+                      <ahyp:hlinkClr xmlns:ahyp="http://schemas.microsoft.com/office/drawing/2018/hyperlinkcolor" val="tx"/>
+                    </a:ext>
+                  </a:extLst>
+                </a:hlinkClick>
+              </a:rPr>
+              <a:t>http://localhost\AP2019_Projet002_projetWEB\recuperationClients\formualireGlobale.xml</a:t>
+            </a:r>
+            <a:endParaRPr lang="fr-FR" sz="1800" dirty="0"/>
+          </a:p>
+          <a:p>
+            <a:pPr lvl="1"/>
+            <a:endParaRPr lang="fr-FR" sz="1800" dirty="0"/>
+          </a:p>
+          <a:p>
+            <a:pPr lvl="1"/>
+            <a:endParaRPr lang="fr-FR" sz="1800" dirty="0"/>
+          </a:p>
+        </p:txBody>
+      </p:sp>
+    </p:spTree>
+    <p:extLst>
+      <p:ext uri="{BB962C8B-B14F-4D97-AF65-F5344CB8AC3E}">
+        <p14:creationId xmlns:p14="http://schemas.microsoft.com/office/powerpoint/2010/main" val="238185473"/>
+      </p:ext>
+    </p:extLst>
+  </p:cSld>
+  <p:clrMapOvr>
+    <a:masterClrMapping/>
+  </p:clrMapOvr>
+  <p:transition spd="slow">
+    <p:push dir="u"/>
   </p:transition>
 </p:sld>
 </file>
@@ -12082,92 +12291,6 @@
           <p:cNvPr id="2" name="Titre 1">
             <a:extLst>
               <a:ext uri="{FF2B5EF4-FFF2-40B4-BE49-F238E27FC236}">
-                <a16:creationId xmlns:a16="http://schemas.microsoft.com/office/drawing/2014/main" id="{4F616B71-496C-47F3-9AF1-7BB09FAC41DF}"/>
-              </a:ext>
-            </a:extLst>
-          </p:cNvPr>
-          <p:cNvSpPr>
-            <a:spLocks noGrp="1"/>
-          </p:cNvSpPr>
-          <p:nvPr>
-            <p:ph type="title"/>
-          </p:nvPr>
-        </p:nvSpPr>
-        <p:spPr/>
-        <p:txBody>
-          <a:bodyPr/>
-          <a:lstStyle/>
-          <a:p>
-            <a:r>
-              <a:rPr lang="fr-FR" dirty="0"/>
-              <a:t>Problématique</a:t>
-            </a:r>
-          </a:p>
-        </p:txBody>
-      </p:sp>
-      <p:sp>
-        <p:nvSpPr>
-          <p:cNvPr id="3" name="Espace réservé du contenu 2">
-            <a:extLst>
-              <a:ext uri="{FF2B5EF4-FFF2-40B4-BE49-F238E27FC236}">
-                <a16:creationId xmlns:a16="http://schemas.microsoft.com/office/drawing/2014/main" id="{157A8151-E933-4290-8863-4E0C18C984BE}"/>
-              </a:ext>
-            </a:extLst>
-          </p:cNvPr>
-          <p:cNvSpPr>
-            <a:spLocks noGrp="1"/>
-          </p:cNvSpPr>
-          <p:nvPr>
-            <p:ph idx="1"/>
-          </p:nvPr>
-        </p:nvSpPr>
-        <p:spPr/>
-        <p:txBody>
-          <a:bodyPr/>
-          <a:lstStyle/>
-          <a:p>
-            <a:endParaRPr lang="fr-FR"/>
-          </a:p>
-        </p:txBody>
-      </p:sp>
-    </p:spTree>
-    <p:extLst>
-      <p:ext uri="{BB962C8B-B14F-4D97-AF65-F5344CB8AC3E}">
-        <p14:creationId xmlns:p14="http://schemas.microsoft.com/office/powerpoint/2010/main" val="655360945"/>
-      </p:ext>
-    </p:extLst>
-  </p:cSld>
-  <p:clrMapOvr>
-    <a:masterClrMapping/>
-  </p:clrMapOvr>
-  <p:transition spd="slow">
-    <p:push dir="u"/>
-  </p:transition>
-</p:sld>
-</file>
-
-<file path=ppt/slides/slide4.xml><?xml version="1.0" encoding="utf-8"?>
-<p:sld xmlns:a="http://schemas.openxmlformats.org/drawingml/2006/main" xmlns:r="http://schemas.openxmlformats.org/officeDocument/2006/relationships" xmlns:p="http://schemas.openxmlformats.org/presentationml/2006/main">
-  <p:cSld>
-    <p:spTree>
-      <p:nvGrpSpPr>
-        <p:cNvPr id="1" name=""/>
-        <p:cNvGrpSpPr/>
-        <p:nvPr/>
-      </p:nvGrpSpPr>
-      <p:grpSpPr>
-        <a:xfrm>
-          <a:off x="0" y="0"/>
-          <a:ext cx="0" cy="0"/>
-          <a:chOff x="0" y="0"/>
-          <a:chExt cx="0" cy="0"/>
-        </a:xfrm>
-      </p:grpSpPr>
-      <p:sp>
-        <p:nvSpPr>
-          <p:cNvPr id="2" name="Titre 1">
-            <a:extLst>
-              <a:ext uri="{FF2B5EF4-FFF2-40B4-BE49-F238E27FC236}">
                 <a16:creationId xmlns:a16="http://schemas.microsoft.com/office/drawing/2014/main" id="{33D07285-3F5D-4262-BF32-0FFBC518C8F7}"/>
               </a:ext>
             </a:extLst>
@@ -12252,7 +12375,7 @@
 </p:sld>
 </file>
 
-<file path=ppt/slides/slide5.xml><?xml version="1.0" encoding="utf-8"?>
+<file path=ppt/slides/slide4.xml><?xml version="1.0" encoding="utf-8"?>
 <p:sld xmlns:a="http://schemas.openxmlformats.org/drawingml/2006/main" xmlns:r="http://schemas.openxmlformats.org/officeDocument/2006/relationships" xmlns:p="http://schemas.openxmlformats.org/presentationml/2006/main">
   <p:cSld>
     <p:spTree>
@@ -12636,7 +12759,7 @@
 </p:sld>
 </file>
 
-<file path=ppt/slides/slide6.xml><?xml version="1.0" encoding="utf-8"?>
+<file path=ppt/slides/slide5.xml><?xml version="1.0" encoding="utf-8"?>
 <p:sld xmlns:a="http://schemas.openxmlformats.org/drawingml/2006/main" xmlns:r="http://schemas.openxmlformats.org/officeDocument/2006/relationships" xmlns:p="http://schemas.openxmlformats.org/presentationml/2006/main">
   <p:cSld>
     <p:spTree>
@@ -12669,9 +12792,16 @@
             <p:ph type="title"/>
           </p:nvPr>
         </p:nvSpPr>
-        <p:spPr/>
+        <p:spPr>
+          <a:xfrm>
+            <a:off x="1066800" y="642594"/>
+            <a:ext cx="10058400" cy="1371600"/>
+          </a:xfrm>
+        </p:spPr>
         <p:txBody>
-          <a:bodyPr/>
+          <a:bodyPr anchor="ctr">
+            <a:normAutofit/>
+          </a:bodyPr>
           <a:lstStyle/>
           <a:p>
             <a:r>
@@ -12681,31 +12811,51 @@
           </a:p>
         </p:txBody>
       </p:sp>
-      <p:sp>
-        <p:nvSpPr>
-          <p:cNvPr id="3" name="Espace réservé du contenu 2">
+      <p:pic>
+        <p:nvPicPr>
+          <p:cNvPr id="1026" name="Picture 2">
             <a:extLst>
               <a:ext uri="{FF2B5EF4-FFF2-40B4-BE49-F238E27FC236}">
-                <a16:creationId xmlns:a16="http://schemas.microsoft.com/office/drawing/2014/main" id="{11F63D87-BB1D-4944-836D-A99D90DA560E}"/>
+                <a16:creationId xmlns:a16="http://schemas.microsoft.com/office/drawing/2014/main" id="{7EF6F689-23B5-4B54-B43C-8EA7373F3F7C}"/>
               </a:ext>
             </a:extLst>
           </p:cNvPr>
-          <p:cNvSpPr>
-            <a:spLocks noGrp="1"/>
-          </p:cNvSpPr>
-          <p:nvPr>
-            <p:ph idx="1"/>
-          </p:nvPr>
-        </p:nvSpPr>
-        <p:spPr/>
-        <p:txBody>
-          <a:bodyPr/>
-          <a:lstStyle/>
-          <a:p>
-            <a:endParaRPr lang="fr-FR"/>
-          </a:p>
-        </p:txBody>
-      </p:sp>
+          <p:cNvPicPr>
+            <a:picLocks noChangeAspect="1" noChangeArrowheads="1"/>
+          </p:cNvPicPr>
+          <p:nvPr/>
+        </p:nvPicPr>
+        <p:blipFill rotWithShape="1">
+          <a:blip r:embed="rId2">
+            <a:extLst>
+              <a:ext uri="{28A0092B-C50C-407E-A947-70E740481C1C}">
+                <a14:useLocalDpi xmlns:a14="http://schemas.microsoft.com/office/drawing/2010/main" val="0"/>
+              </a:ext>
+            </a:extLst>
+          </a:blip>
+          <a:srcRect l="11200"/>
+          <a:stretch/>
+        </p:blipFill>
+        <p:spPr bwMode="auto">
+          <a:xfrm>
+            <a:off x="1875669" y="2103120"/>
+            <a:ext cx="8440661" cy="3849624"/>
+          </a:xfrm>
+          <a:prstGeom prst="rect">
+            <a:avLst/>
+          </a:prstGeom>
+          <a:noFill/>
+          <a:extLst>
+            <a:ext uri="{909E8E84-426E-40DD-AFC4-6F175D3DCCD1}">
+              <a14:hiddenFill xmlns:a14="http://schemas.microsoft.com/office/drawing/2010/main">
+                <a:solidFill>
+                  <a:srgbClr val="FFFFFF"/>
+                </a:solidFill>
+              </a14:hiddenFill>
+            </a:ext>
+          </a:extLst>
+        </p:spPr>
+      </p:pic>
     </p:spTree>
     <p:extLst>
       <p:ext uri="{BB962C8B-B14F-4D97-AF65-F5344CB8AC3E}">
@@ -12722,7 +12872,7 @@
 </p:sld>
 </file>
 
-<file path=ppt/slides/slide7.xml><?xml version="1.0" encoding="utf-8"?>
+<file path=ppt/slides/slide6.xml><?xml version="1.0" encoding="utf-8"?>
 <p:sld xmlns:a="http://schemas.openxmlformats.org/drawingml/2006/main" xmlns:r="http://schemas.openxmlformats.org/officeDocument/2006/relationships" xmlns:p="http://schemas.openxmlformats.org/presentationml/2006/main">
   <p:cSld>
     <p:spTree>
@@ -12755,9 +12905,16 @@
             <p:ph type="title"/>
           </p:nvPr>
         </p:nvSpPr>
-        <p:spPr/>
+        <p:spPr>
+          <a:xfrm>
+            <a:off x="1066800" y="642594"/>
+            <a:ext cx="10058400" cy="1371600"/>
+          </a:xfrm>
+        </p:spPr>
         <p:txBody>
-          <a:bodyPr/>
+          <a:bodyPr anchor="ctr">
+            <a:normAutofit/>
+          </a:bodyPr>
           <a:lstStyle/>
           <a:p>
             <a:r>
@@ -12767,31 +12924,53 @@
           </a:p>
         </p:txBody>
       </p:sp>
-      <p:sp>
-        <p:nvSpPr>
-          <p:cNvPr id="3" name="Espace réservé du contenu 2">
+      <p:pic>
+        <p:nvPicPr>
+          <p:cNvPr id="2050" name="Picture 2">
             <a:extLst>
               <a:ext uri="{FF2B5EF4-FFF2-40B4-BE49-F238E27FC236}">
-                <a16:creationId xmlns:a16="http://schemas.microsoft.com/office/drawing/2014/main" id="{E6D75D90-94D0-42BE-8E5B-D11E349BB58E}"/>
+                <a16:creationId xmlns:a16="http://schemas.microsoft.com/office/drawing/2014/main" id="{4B6856F3-BEFF-45F3-911E-6D4E18C758B7}"/>
               </a:ext>
             </a:extLst>
           </p:cNvPr>
-          <p:cNvSpPr>
-            <a:spLocks noGrp="1"/>
-          </p:cNvSpPr>
-          <p:nvPr>
-            <p:ph idx="1"/>
-          </p:nvPr>
-        </p:nvSpPr>
-        <p:spPr/>
-        <p:txBody>
-          <a:bodyPr/>
-          <a:lstStyle/>
-          <a:p>
-            <a:endParaRPr lang="fr-FR"/>
-          </a:p>
-        </p:txBody>
-      </p:sp>
+          <p:cNvPicPr>
+            <a:picLocks noChangeAspect="1" noChangeArrowheads="1"/>
+          </p:cNvPicPr>
+          <p:nvPr/>
+        </p:nvPicPr>
+        <p:blipFill rotWithShape="1">
+          <a:blip r:embed="rId2">
+            <a:extLst>
+              <a:ext uri="{28A0092B-C50C-407E-A947-70E740481C1C}">
+                <a14:useLocalDpi xmlns:a14="http://schemas.microsoft.com/office/drawing/2010/main" val="0"/>
+              </a:ext>
+            </a:extLst>
+          </a:blip>
+          <a:srcRect l="12589"/>
+          <a:stretch/>
+        </p:blipFill>
+        <p:spPr bwMode="auto">
+          <a:xfrm>
+            <a:off x="1941683" y="2103120"/>
+            <a:ext cx="8308633" cy="3849624"/>
+          </a:xfrm>
+          <a:prstGeom prst="rect">
+            <a:avLst/>
+          </a:prstGeom>
+          <a:solidFill>
+            <a:srgbClr val="FFFFFF"/>
+          </a:solidFill>
+          <a:extLst>
+            <a:ext uri="{909E8E84-426E-40DD-AFC4-6F175D3DCCD1}">
+              <a14:hiddenFill xmlns:a14="http://schemas.microsoft.com/office/drawing/2010/main">
+                <a:solidFill>
+                  <a:srgbClr val="FFFFFF"/>
+                </a:solidFill>
+              </a14:hiddenFill>
+            </a:ext>
+          </a:extLst>
+        </p:spPr>
+      </p:pic>
     </p:spTree>
     <p:extLst>
       <p:ext uri="{BB962C8B-B14F-4D97-AF65-F5344CB8AC3E}">
@@ -12808,7 +12987,7 @@
 </p:sld>
 </file>
 
-<file path=ppt/slides/slide8.xml><?xml version="1.0" encoding="utf-8"?>
+<file path=ppt/slides/slide7.xml><?xml version="1.0" encoding="utf-8"?>
 <p:sld xmlns:a="http://schemas.openxmlformats.org/drawingml/2006/main" xmlns:r="http://schemas.openxmlformats.org/officeDocument/2006/relationships" xmlns:p="http://schemas.openxmlformats.org/presentationml/2006/main">
   <p:cSld>
     <p:spTree>
@@ -12869,14 +13048,14 @@
             <p:ph idx="1"/>
             <p:extLst>
               <p:ext uri="{D42A27DB-BD31-4B8C-83A1-F6EECF244321}">
-                <p14:modId xmlns:p14="http://schemas.microsoft.com/office/powerpoint/2010/main" val="3136953306"/>
+                <p14:modId xmlns:p14="http://schemas.microsoft.com/office/powerpoint/2010/main" val="2844453427"/>
               </p:ext>
             </p:extLst>
           </p:nvPr>
         </p:nvGraphicFramePr>
         <p:xfrm>
-          <a:off x="1066800" y="2103437"/>
-          <a:ext cx="10058400" cy="1453551"/>
+          <a:off x="1066800" y="2427904"/>
+          <a:ext cx="10058400" cy="2002191"/>
         </p:xfrm>
         <a:graphic>
           <a:graphicData uri="http://schemas.openxmlformats.org/drawingml/2006/table">
@@ -12970,6 +13149,26 @@
                         <a:t>XML</a:t>
                       </a:r>
                     </a:p>
+                    <a:p>
+                      <a:pPr marL="285750" indent="-285750">
+                        <a:buFontTx/>
+                        <a:buChar char="-"/>
+                      </a:pPr>
+                      <a:r>
+                        <a:rPr lang="fr-FR" dirty="0"/>
+                        <a:t>Rédaction des dossiers</a:t>
+                      </a:r>
+                    </a:p>
+                    <a:p>
+                      <a:pPr marL="285750" indent="-285750">
+                        <a:buFontTx/>
+                        <a:buChar char="-"/>
+                      </a:pPr>
+                      <a:r>
+                        <a:rPr lang="fr-FR" dirty="0"/>
+                        <a:t>Powerpoint</a:t>
+                      </a:r>
+                    </a:p>
                   </a:txBody>
                   <a:tcPr/>
                 </a:tc>
@@ -13007,6 +13206,26 @@
                         <a:t>Introduction dans le projet</a:t>
                       </a:r>
                     </a:p>
+                    <a:p>
+                      <a:pPr marL="285750" indent="-285750">
+                        <a:buFontTx/>
+                        <a:buChar char="-"/>
+                      </a:pPr>
+                      <a:r>
+                        <a:rPr lang="fr-FR" dirty="0"/>
+                        <a:t>Rédaction des dossiers</a:t>
+                      </a:r>
+                    </a:p>
+                    <a:p>
+                      <a:pPr marL="285750" indent="-285750">
+                        <a:buFontTx/>
+                        <a:buChar char="-"/>
+                      </a:pPr>
+                      <a:r>
+                        <a:rPr lang="fr-FR" dirty="0"/>
+                        <a:t>Powerpoint</a:t>
+                      </a:r>
+                    </a:p>
                   </a:txBody>
                   <a:tcPr/>
                 </a:tc>
@@ -13036,7 +13255,7 @@
 </p:sld>
 </file>
 
-<file path=ppt/slides/slide9.xml><?xml version="1.0" encoding="utf-8"?>
+<file path=ppt/slides/slide8.xml><?xml version="1.0" encoding="utf-8"?>
 <p:sld xmlns:a="http://schemas.openxmlformats.org/drawingml/2006/main" xmlns:r="http://schemas.openxmlformats.org/officeDocument/2006/relationships" xmlns:p="http://schemas.openxmlformats.org/presentationml/2006/main">
   <p:cSld>
     <p:spTree>
@@ -13131,6 +13350,229 @@
   <p:transition spd="slow">
     <p:push dir="u"/>
   </p:transition>
+</p:sld>
+</file>
+
+<file path=ppt/slides/slide9.xml><?xml version="1.0" encoding="utf-8"?>
+<p:sld xmlns:a="http://schemas.openxmlformats.org/drawingml/2006/main" xmlns:r="http://schemas.openxmlformats.org/officeDocument/2006/relationships" xmlns:p="http://schemas.openxmlformats.org/presentationml/2006/main">
+  <p:cSld>
+    <p:spTree>
+      <p:nvGrpSpPr>
+        <p:cNvPr id="1" name=""/>
+        <p:cNvGrpSpPr/>
+        <p:nvPr/>
+      </p:nvGrpSpPr>
+      <p:grpSpPr>
+        <a:xfrm>
+          <a:off x="0" y="0"/>
+          <a:ext cx="0" cy="0"/>
+          <a:chOff x="0" y="0"/>
+          <a:chExt cx="0" cy="0"/>
+        </a:xfrm>
+      </p:grpSpPr>
+      <p:sp>
+        <p:nvSpPr>
+          <p:cNvPr id="2" name="Titre 1">
+            <a:extLst>
+              <a:ext uri="{FF2B5EF4-FFF2-40B4-BE49-F238E27FC236}">
+                <a16:creationId xmlns:a16="http://schemas.microsoft.com/office/drawing/2014/main" id="{4FDFCAD4-8F21-45BD-A1E0-8A1F3BFDB357}"/>
+              </a:ext>
+            </a:extLst>
+          </p:cNvPr>
+          <p:cNvSpPr>
+            <a:spLocks noGrp="1"/>
+          </p:cNvSpPr>
+          <p:nvPr>
+            <p:ph type="title"/>
+          </p:nvPr>
+        </p:nvSpPr>
+        <p:spPr>
+          <a:xfrm>
+            <a:off x="1066800" y="642594"/>
+            <a:ext cx="10058400" cy="1371600"/>
+          </a:xfrm>
+        </p:spPr>
+        <p:txBody>
+          <a:bodyPr anchor="ctr">
+            <a:normAutofit/>
+          </a:bodyPr>
+          <a:lstStyle/>
+          <a:p>
+            <a:r>
+              <a:rPr lang="fr-FR" dirty="0"/>
+              <a:t>Maquettage / interaction flow</a:t>
+            </a:r>
+          </a:p>
+        </p:txBody>
+      </p:sp>
+      <p:pic>
+        <p:nvPicPr>
+          <p:cNvPr id="4" name="Graphique 3">
+            <a:extLst>
+              <a:ext uri="{FF2B5EF4-FFF2-40B4-BE49-F238E27FC236}">
+                <a16:creationId xmlns:a16="http://schemas.microsoft.com/office/drawing/2014/main" id="{42242A9F-69FD-43EB-8A98-F648AB465CA0}"/>
+              </a:ext>
+            </a:extLst>
+          </p:cNvPr>
+          <p:cNvPicPr>
+            <a:picLocks noChangeAspect="1"/>
+          </p:cNvPicPr>
+          <p:nvPr/>
+        </p:nvPicPr>
+        <p:blipFill>
+          <a:blip r:embed="rId2">
+            <a:extLst>
+              <a:ext uri="{96DAC541-7B7A-43D3-8B79-37D633B846F1}">
+                <asvg:svgBlip xmlns:asvg="http://schemas.microsoft.com/office/drawing/2016/SVG/main" r:embed="rId3"/>
+              </a:ext>
+            </a:extLst>
+          </a:blip>
+          <a:stretch>
+            <a:fillRect/>
+          </a:stretch>
+        </p:blipFill>
+        <p:spPr>
+          <a:xfrm>
+            <a:off x="6467822" y="3485415"/>
+            <a:ext cx="4853319" cy="2729991"/>
+          </a:xfrm>
+          <a:prstGeom prst="rect">
+            <a:avLst/>
+          </a:prstGeom>
+        </p:spPr>
+      </p:pic>
+      <p:pic>
+        <p:nvPicPr>
+          <p:cNvPr id="5" name="Graphique 4">
+            <a:extLst>
+              <a:ext uri="{FF2B5EF4-FFF2-40B4-BE49-F238E27FC236}">
+                <a16:creationId xmlns:a16="http://schemas.microsoft.com/office/drawing/2014/main" id="{3BF666B2-A331-4240-9901-8F846242FDFD}"/>
+              </a:ext>
+            </a:extLst>
+          </p:cNvPr>
+          <p:cNvPicPr>
+            <a:picLocks noChangeAspect="1"/>
+          </p:cNvPicPr>
+          <p:nvPr/>
+        </p:nvPicPr>
+        <p:blipFill>
+          <a:blip r:embed="rId4">
+            <a:extLst>
+              <a:ext uri="{96DAC541-7B7A-43D3-8B79-37D633B846F1}">
+                <asvg:svgBlip xmlns:asvg="http://schemas.microsoft.com/office/drawing/2016/SVG/main" r:embed="rId5"/>
+              </a:ext>
+            </a:extLst>
+          </a:blip>
+          <a:stretch>
+            <a:fillRect/>
+          </a:stretch>
+        </p:blipFill>
+        <p:spPr>
+          <a:xfrm>
+            <a:off x="516298" y="2014194"/>
+            <a:ext cx="4853319" cy="2729992"/>
+          </a:xfrm>
+          <a:prstGeom prst="rect">
+            <a:avLst/>
+          </a:prstGeom>
+        </p:spPr>
+      </p:pic>
+    </p:spTree>
+    <p:extLst>
+      <p:ext uri="{BB962C8B-B14F-4D97-AF65-F5344CB8AC3E}">
+        <p14:creationId xmlns:p14="http://schemas.microsoft.com/office/powerpoint/2010/main" val="2676148001"/>
+      </p:ext>
+    </p:extLst>
+  </p:cSld>
+  <p:clrMapOvr>
+    <a:masterClrMapping/>
+  </p:clrMapOvr>
+  <p:transition spd="slow">
+    <p:push dir="u"/>
+  </p:transition>
+  <p:timing>
+    <p:tnLst>
+      <p:par>
+        <p:cTn id="1" dur="indefinite" restart="never" nodeType="tmRoot">
+          <p:childTnLst>
+            <p:seq concurrent="1" nextAc="seek">
+              <p:cTn id="2" dur="indefinite" nodeType="mainSeq">
+                <p:childTnLst>
+                  <p:par>
+                    <p:cTn id="3" fill="hold">
+                      <p:stCondLst>
+                        <p:cond delay="indefinite"/>
+                      </p:stCondLst>
+                      <p:childTnLst>
+                        <p:par>
+                          <p:cTn id="4" fill="hold">
+                            <p:stCondLst>
+                              <p:cond delay="0"/>
+                            </p:stCondLst>
+                            <p:childTnLst>
+                              <p:par>
+                                <p:cTn id="5" presetID="10" presetClass="entr" presetSubtype="0" fill="hold" nodeType="clickEffect">
+                                  <p:stCondLst>
+                                    <p:cond delay="0"/>
+                                  </p:stCondLst>
+                                  <p:childTnLst>
+                                    <p:set>
+                                      <p:cBhvr>
+                                        <p:cTn id="6" dur="1" fill="hold">
+                                          <p:stCondLst>
+                                            <p:cond delay="0"/>
+                                          </p:stCondLst>
+                                        </p:cTn>
+                                        <p:tgtEl>
+                                          <p:spTgt spid="4"/>
+                                        </p:tgtEl>
+                                        <p:attrNameLst>
+                                          <p:attrName>style.visibility</p:attrName>
+                                        </p:attrNameLst>
+                                      </p:cBhvr>
+                                      <p:to>
+                                        <p:strVal val="visible"/>
+                                      </p:to>
+                                    </p:set>
+                                    <p:animEffect transition="in" filter="fade">
+                                      <p:cBhvr>
+                                        <p:cTn id="7" dur="500"/>
+                                        <p:tgtEl>
+                                          <p:spTgt spid="4"/>
+                                        </p:tgtEl>
+                                      </p:cBhvr>
+                                    </p:animEffect>
+                                  </p:childTnLst>
+                                </p:cTn>
+                              </p:par>
+                            </p:childTnLst>
+                          </p:cTn>
+                        </p:par>
+                      </p:childTnLst>
+                    </p:cTn>
+                  </p:par>
+                </p:childTnLst>
+              </p:cTn>
+              <p:prevCondLst>
+                <p:cond evt="onPrev" delay="0">
+                  <p:tgtEl>
+                    <p:sldTgt/>
+                  </p:tgtEl>
+                </p:cond>
+              </p:prevCondLst>
+              <p:nextCondLst>
+                <p:cond evt="onNext" delay="0">
+                  <p:tgtEl>
+                    <p:sldTgt/>
+                  </p:tgtEl>
+                </p:cond>
+              </p:nextCondLst>
+            </p:seq>
+          </p:childTnLst>
+        </p:cTn>
+      </p:par>
+    </p:tnLst>
+  </p:timing>
 </p:sld>
 </file>
 

</xml_diff>